<commit_message>
Correções das figuras de fcr (mesmo diretório) e da expressão despesa (por demanda).
</commit_message>
<xml_diff>
--- a/figuras/figuras.pptx
+++ b/figuras/figuras.pptx
@@ -262,7 +262,7 @@
           <a:p>
             <a:fld id="{EF1DDDAF-6674-4FDC-80AF-B2916432F812}" type="datetimeFigureOut">
               <a:rPr lang="pt-BR" smtClean="0"/>
-              <a:t>19/05/2021</a:t>
+              <a:t>22/05/2021</a:t>
             </a:fld>
             <a:endParaRPr lang="pt-BR"/>
           </a:p>
@@ -460,7 +460,7 @@
           <a:p>
             <a:fld id="{EF1DDDAF-6674-4FDC-80AF-B2916432F812}" type="datetimeFigureOut">
               <a:rPr lang="pt-BR" smtClean="0"/>
-              <a:t>19/05/2021</a:t>
+              <a:t>22/05/2021</a:t>
             </a:fld>
             <a:endParaRPr lang="pt-BR"/>
           </a:p>
@@ -668,7 +668,7 @@
           <a:p>
             <a:fld id="{EF1DDDAF-6674-4FDC-80AF-B2916432F812}" type="datetimeFigureOut">
               <a:rPr lang="pt-BR" smtClean="0"/>
-              <a:t>19/05/2021</a:t>
+              <a:t>22/05/2021</a:t>
             </a:fld>
             <a:endParaRPr lang="pt-BR"/>
           </a:p>
@@ -866,7 +866,7 @@
           <a:p>
             <a:fld id="{EF1DDDAF-6674-4FDC-80AF-B2916432F812}" type="datetimeFigureOut">
               <a:rPr lang="pt-BR" smtClean="0"/>
-              <a:t>19/05/2021</a:t>
+              <a:t>22/05/2021</a:t>
             </a:fld>
             <a:endParaRPr lang="pt-BR"/>
           </a:p>
@@ -1141,7 +1141,7 @@
           <a:p>
             <a:fld id="{EF1DDDAF-6674-4FDC-80AF-B2916432F812}" type="datetimeFigureOut">
               <a:rPr lang="pt-BR" smtClean="0"/>
-              <a:t>19/05/2021</a:t>
+              <a:t>22/05/2021</a:t>
             </a:fld>
             <a:endParaRPr lang="pt-BR"/>
           </a:p>
@@ -1406,7 +1406,7 @@
           <a:p>
             <a:fld id="{EF1DDDAF-6674-4FDC-80AF-B2916432F812}" type="datetimeFigureOut">
               <a:rPr lang="pt-BR" smtClean="0"/>
-              <a:t>19/05/2021</a:t>
+              <a:t>22/05/2021</a:t>
             </a:fld>
             <a:endParaRPr lang="pt-BR"/>
           </a:p>
@@ -1818,7 +1818,7 @@
           <a:p>
             <a:fld id="{EF1DDDAF-6674-4FDC-80AF-B2916432F812}" type="datetimeFigureOut">
               <a:rPr lang="pt-BR" smtClean="0"/>
-              <a:t>19/05/2021</a:t>
+              <a:t>22/05/2021</a:t>
             </a:fld>
             <a:endParaRPr lang="pt-BR"/>
           </a:p>
@@ -1959,7 +1959,7 @@
           <a:p>
             <a:fld id="{EF1DDDAF-6674-4FDC-80AF-B2916432F812}" type="datetimeFigureOut">
               <a:rPr lang="pt-BR" smtClean="0"/>
-              <a:t>19/05/2021</a:t>
+              <a:t>22/05/2021</a:t>
             </a:fld>
             <a:endParaRPr lang="pt-BR"/>
           </a:p>
@@ -2072,7 +2072,7 @@
           <a:p>
             <a:fld id="{EF1DDDAF-6674-4FDC-80AF-B2916432F812}" type="datetimeFigureOut">
               <a:rPr lang="pt-BR" smtClean="0"/>
-              <a:t>19/05/2021</a:t>
+              <a:t>22/05/2021</a:t>
             </a:fld>
             <a:endParaRPr lang="pt-BR"/>
           </a:p>
@@ -2383,7 +2383,7 @@
           <a:p>
             <a:fld id="{EF1DDDAF-6674-4FDC-80AF-B2916432F812}" type="datetimeFigureOut">
               <a:rPr lang="pt-BR" smtClean="0"/>
-              <a:t>19/05/2021</a:t>
+              <a:t>22/05/2021</a:t>
             </a:fld>
             <a:endParaRPr lang="pt-BR"/>
           </a:p>
@@ -2671,7 +2671,7 @@
           <a:p>
             <a:fld id="{EF1DDDAF-6674-4FDC-80AF-B2916432F812}" type="datetimeFigureOut">
               <a:rPr lang="pt-BR" smtClean="0"/>
-              <a:t>19/05/2021</a:t>
+              <a:t>22/05/2021</a:t>
             </a:fld>
             <a:endParaRPr lang="pt-BR"/>
           </a:p>
@@ -2912,7 +2912,7 @@
           <a:p>
             <a:fld id="{EF1DDDAF-6674-4FDC-80AF-B2916432F812}" type="datetimeFigureOut">
               <a:rPr lang="pt-BR" smtClean="0"/>
-              <a:t>19/05/2021</a:t>
+              <a:t>22/05/2021</a:t>
             </a:fld>
             <a:endParaRPr lang="pt-BR"/>
           </a:p>
@@ -4705,6 +4705,55 @@
           <a:chExt cx="0" cy="0"/>
         </a:xfrm>
       </p:grpSpPr>
+      <p:sp>
+        <p:nvSpPr>
+          <p:cNvPr id="3" name="Retângulo 2">
+            <a:extLst>
+              <a:ext uri="{FF2B5EF4-FFF2-40B4-BE49-F238E27FC236}">
+                <a16:creationId xmlns:a16="http://schemas.microsoft.com/office/drawing/2014/main" id="{CB41D20C-27B9-477F-B2C0-4E2923E190F0}"/>
+              </a:ext>
+            </a:extLst>
+          </p:cNvPr>
+          <p:cNvSpPr/>
+          <p:nvPr/>
+        </p:nvSpPr>
+        <p:spPr>
+          <a:xfrm>
+            <a:off x="-297713" y="-127591"/>
+            <a:ext cx="12961089" cy="7347098"/>
+          </a:xfrm>
+          <a:prstGeom prst="rect">
+            <a:avLst/>
+          </a:prstGeom>
+          <a:solidFill>
+            <a:srgbClr val="23395B"/>
+          </a:solidFill>
+        </p:spPr>
+        <p:style>
+          <a:lnRef idx="2">
+            <a:schemeClr val="accent1">
+              <a:shade val="50000"/>
+            </a:schemeClr>
+          </a:lnRef>
+          <a:fillRef idx="1">
+            <a:schemeClr val="accent1"/>
+          </a:fillRef>
+          <a:effectRef idx="0">
+            <a:schemeClr val="accent1"/>
+          </a:effectRef>
+          <a:fontRef idx="minor">
+            <a:schemeClr val="lt1"/>
+          </a:fontRef>
+        </p:style>
+        <p:txBody>
+          <a:bodyPr rtlCol="0" anchor="ctr"/>
+          <a:lstStyle/>
+          <a:p>
+            <a:pPr algn="ctr"/>
+            <a:endParaRPr lang="pt-BR"/>
+          </a:p>
+        </p:txBody>
+      </p:sp>
       <p:pic>
         <p:nvPicPr>
           <p:cNvPr id="2" name="Imagem 1">
@@ -6116,7 +6165,7 @@
                 <a:latin typeface="Roboto" panose="020B0604020202090204" pitchFamily="2" charset="0"/>
                 <a:ea typeface="Roboto" panose="020B0604020202090204" pitchFamily="2" charset="0"/>
               </a:rPr>
-              <a:t>MERCADO FINANCEIRO</a:t>
+              <a:t>MERCADO DE BENS DE CAPITAL</a:t>
             </a:r>
           </a:p>
         </p:txBody>
@@ -6579,12 +6628,61 @@
           <a:chExt cx="0" cy="0"/>
         </a:xfrm>
       </p:grpSpPr>
+      <p:sp>
+        <p:nvSpPr>
+          <p:cNvPr id="37" name="Retângulo 36">
+            <a:extLst>
+              <a:ext uri="{FF2B5EF4-FFF2-40B4-BE49-F238E27FC236}">
+                <a16:creationId xmlns:a16="http://schemas.microsoft.com/office/drawing/2014/main" id="{0BA2F511-AC4F-408C-98A1-4BDCE5B57AA6}"/>
+              </a:ext>
+            </a:extLst>
+          </p:cNvPr>
+          <p:cNvSpPr/>
+          <p:nvPr/>
+        </p:nvSpPr>
+        <p:spPr>
+          <a:xfrm>
+            <a:off x="-297713" y="-127591"/>
+            <a:ext cx="12961089" cy="7347098"/>
+          </a:xfrm>
+          <a:prstGeom prst="rect">
+            <a:avLst/>
+          </a:prstGeom>
+          <a:solidFill>
+            <a:srgbClr val="23395B"/>
+          </a:solidFill>
+        </p:spPr>
+        <p:style>
+          <a:lnRef idx="2">
+            <a:schemeClr val="accent1">
+              <a:shade val="50000"/>
+            </a:schemeClr>
+          </a:lnRef>
+          <a:fillRef idx="1">
+            <a:schemeClr val="accent1"/>
+          </a:fillRef>
+          <a:effectRef idx="0">
+            <a:schemeClr val="accent1"/>
+          </a:effectRef>
+          <a:fontRef idx="minor">
+            <a:schemeClr val="lt1"/>
+          </a:fontRef>
+        </p:style>
+        <p:txBody>
+          <a:bodyPr rtlCol="0" anchor="ctr"/>
+          <a:lstStyle/>
+          <a:p>
+            <a:pPr algn="ctr"/>
+            <a:endParaRPr lang="pt-BR"/>
+          </a:p>
+        </p:txBody>
+      </p:sp>
       <p:pic>
         <p:nvPicPr>
-          <p:cNvPr id="3" name="Imagem 2">
-            <a:extLst>
-              <a:ext uri="{FF2B5EF4-FFF2-40B4-BE49-F238E27FC236}">
-                <a16:creationId xmlns:a16="http://schemas.microsoft.com/office/drawing/2014/main" id="{80574330-65FD-4DF3-B6C1-699F813E0BDF}"/>
+          <p:cNvPr id="36" name="Imagem 35">
+            <a:extLst>
+              <a:ext uri="{FF2B5EF4-FFF2-40B4-BE49-F238E27FC236}">
+                <a16:creationId xmlns:a16="http://schemas.microsoft.com/office/drawing/2014/main" id="{8C734911-F322-4F5D-A743-CBEDE3593C65}"/>
               </a:ext>
             </a:extLst>
           </p:cNvPr>
@@ -6601,8 +6699,8 @@
         </p:blipFill>
         <p:spPr>
           <a:xfrm>
-            <a:off x="0" y="454827"/>
-            <a:ext cx="12192000" cy="5948346"/>
+            <a:off x="0" y="456113"/>
+            <a:ext cx="12192000" cy="5945774"/>
           </a:xfrm>
           <a:prstGeom prst="rect">
             <a:avLst/>

</xml_diff>

<commit_message>
Adequação dos slides para aumento da fonte.
</commit_message>
<xml_diff>
--- a/figuras/figuras.pptx
+++ b/figuras/figuras.pptx
@@ -9,6 +9,7 @@
     <p:sldId id="265" r:id="rId3"/>
     <p:sldId id="261" r:id="rId4"/>
     <p:sldId id="263" r:id="rId5"/>
+    <p:sldId id="266" r:id="rId6"/>
   </p:sldIdLst>
   <p:sldSz cx="12192000" cy="6858000"/>
   <p:notesSz cx="6858000" cy="9144000"/>
@@ -262,7 +263,7 @@
           <a:p>
             <a:fld id="{EF1DDDAF-6674-4FDC-80AF-B2916432F812}" type="datetimeFigureOut">
               <a:rPr lang="pt-BR" smtClean="0"/>
-              <a:t>22/05/2021</a:t>
+              <a:t>23/06/2021</a:t>
             </a:fld>
             <a:endParaRPr lang="pt-BR"/>
           </a:p>
@@ -460,7 +461,7 @@
           <a:p>
             <a:fld id="{EF1DDDAF-6674-4FDC-80AF-B2916432F812}" type="datetimeFigureOut">
               <a:rPr lang="pt-BR" smtClean="0"/>
-              <a:t>22/05/2021</a:t>
+              <a:t>23/06/2021</a:t>
             </a:fld>
             <a:endParaRPr lang="pt-BR"/>
           </a:p>
@@ -668,7 +669,7 @@
           <a:p>
             <a:fld id="{EF1DDDAF-6674-4FDC-80AF-B2916432F812}" type="datetimeFigureOut">
               <a:rPr lang="pt-BR" smtClean="0"/>
-              <a:t>22/05/2021</a:t>
+              <a:t>23/06/2021</a:t>
             </a:fld>
             <a:endParaRPr lang="pt-BR"/>
           </a:p>
@@ -866,7 +867,7 @@
           <a:p>
             <a:fld id="{EF1DDDAF-6674-4FDC-80AF-B2916432F812}" type="datetimeFigureOut">
               <a:rPr lang="pt-BR" smtClean="0"/>
-              <a:t>22/05/2021</a:t>
+              <a:t>23/06/2021</a:t>
             </a:fld>
             <a:endParaRPr lang="pt-BR"/>
           </a:p>
@@ -1141,7 +1142,7 @@
           <a:p>
             <a:fld id="{EF1DDDAF-6674-4FDC-80AF-B2916432F812}" type="datetimeFigureOut">
               <a:rPr lang="pt-BR" smtClean="0"/>
-              <a:t>22/05/2021</a:t>
+              <a:t>23/06/2021</a:t>
             </a:fld>
             <a:endParaRPr lang="pt-BR"/>
           </a:p>
@@ -1406,7 +1407,7 @@
           <a:p>
             <a:fld id="{EF1DDDAF-6674-4FDC-80AF-B2916432F812}" type="datetimeFigureOut">
               <a:rPr lang="pt-BR" smtClean="0"/>
-              <a:t>22/05/2021</a:t>
+              <a:t>23/06/2021</a:t>
             </a:fld>
             <a:endParaRPr lang="pt-BR"/>
           </a:p>
@@ -1818,7 +1819,7 @@
           <a:p>
             <a:fld id="{EF1DDDAF-6674-4FDC-80AF-B2916432F812}" type="datetimeFigureOut">
               <a:rPr lang="pt-BR" smtClean="0"/>
-              <a:t>22/05/2021</a:t>
+              <a:t>23/06/2021</a:t>
             </a:fld>
             <a:endParaRPr lang="pt-BR"/>
           </a:p>
@@ -1959,7 +1960,7 @@
           <a:p>
             <a:fld id="{EF1DDDAF-6674-4FDC-80AF-B2916432F812}" type="datetimeFigureOut">
               <a:rPr lang="pt-BR" smtClean="0"/>
-              <a:t>22/05/2021</a:t>
+              <a:t>23/06/2021</a:t>
             </a:fld>
             <a:endParaRPr lang="pt-BR"/>
           </a:p>
@@ -2072,7 +2073,7 @@
           <a:p>
             <a:fld id="{EF1DDDAF-6674-4FDC-80AF-B2916432F812}" type="datetimeFigureOut">
               <a:rPr lang="pt-BR" smtClean="0"/>
-              <a:t>22/05/2021</a:t>
+              <a:t>23/06/2021</a:t>
             </a:fld>
             <a:endParaRPr lang="pt-BR"/>
           </a:p>
@@ -2383,7 +2384,7 @@
           <a:p>
             <a:fld id="{EF1DDDAF-6674-4FDC-80AF-B2916432F812}" type="datetimeFigureOut">
               <a:rPr lang="pt-BR" smtClean="0"/>
-              <a:t>22/05/2021</a:t>
+              <a:t>23/06/2021</a:t>
             </a:fld>
             <a:endParaRPr lang="pt-BR"/>
           </a:p>
@@ -2671,7 +2672,7 @@
           <a:p>
             <a:fld id="{EF1DDDAF-6674-4FDC-80AF-B2916432F812}" type="datetimeFigureOut">
               <a:rPr lang="pt-BR" smtClean="0"/>
-              <a:t>22/05/2021</a:t>
+              <a:t>23/06/2021</a:t>
             </a:fld>
             <a:endParaRPr lang="pt-BR"/>
           </a:p>
@@ -2912,7 +2913,7 @@
           <a:p>
             <a:fld id="{EF1DDDAF-6674-4FDC-80AF-B2916432F812}" type="datetimeFigureOut">
               <a:rPr lang="pt-BR" smtClean="0"/>
-              <a:t>22/05/2021</a:t>
+              <a:t>23/06/2021</a:t>
             </a:fld>
             <a:endParaRPr lang="pt-BR"/>
           </a:p>
@@ -6720,6 +6721,2275 @@
 </p:sld>
 </file>
 
+<file path=ppt/slides/slide5.xml><?xml version="1.0" encoding="utf-8"?>
+<p:sld xmlns:a="http://schemas.openxmlformats.org/drawingml/2006/main" xmlns:r="http://schemas.openxmlformats.org/officeDocument/2006/relationships" xmlns:p="http://schemas.openxmlformats.org/presentationml/2006/main">
+  <p:cSld>
+    <p:spTree>
+      <p:nvGrpSpPr>
+        <p:cNvPr id="1" name=""/>
+        <p:cNvGrpSpPr/>
+        <p:nvPr/>
+      </p:nvGrpSpPr>
+      <p:grpSpPr>
+        <a:xfrm>
+          <a:off x="0" y="0"/>
+          <a:ext cx="0" cy="0"/>
+          <a:chOff x="0" y="0"/>
+          <a:chExt cx="0" cy="0"/>
+        </a:xfrm>
+      </p:grpSpPr>
+      <p:sp>
+        <p:nvSpPr>
+          <p:cNvPr id="4" name="Retângulo 3">
+            <a:extLst>
+              <a:ext uri="{FF2B5EF4-FFF2-40B4-BE49-F238E27FC236}">
+                <a16:creationId xmlns:a16="http://schemas.microsoft.com/office/drawing/2014/main" id="{9B0EFDB4-C965-47EB-A06F-23EEC33BBB6F}"/>
+              </a:ext>
+            </a:extLst>
+          </p:cNvPr>
+          <p:cNvSpPr/>
+          <p:nvPr/>
+        </p:nvSpPr>
+        <p:spPr>
+          <a:xfrm>
+            <a:off x="2197079" y="890568"/>
+            <a:ext cx="2880320" cy="914400"/>
+          </a:xfrm>
+          <a:prstGeom prst="rect">
+            <a:avLst/>
+          </a:prstGeom>
+          <a:solidFill>
+            <a:srgbClr val="704441"/>
+          </a:solidFill>
+          <a:ln>
+            <a:noFill/>
+          </a:ln>
+        </p:spPr>
+        <p:style>
+          <a:lnRef idx="2">
+            <a:schemeClr val="accent1">
+              <a:shade val="50000"/>
+            </a:schemeClr>
+          </a:lnRef>
+          <a:fillRef idx="1">
+            <a:schemeClr val="accent1"/>
+          </a:fillRef>
+          <a:effectRef idx="0">
+            <a:schemeClr val="accent1"/>
+          </a:effectRef>
+          <a:fontRef idx="minor">
+            <a:schemeClr val="lt1"/>
+          </a:fontRef>
+        </p:style>
+        <p:txBody>
+          <a:bodyPr rtlCol="0" anchor="ctr"/>
+          <a:lstStyle/>
+          <a:p>
+            <a:pPr algn="ctr"/>
+            <a:r>
+              <a:rPr lang="pt-BR" sz="2400" dirty="0">
+                <a:latin typeface="Times New Roman" panose="02020603050405020304" pitchFamily="18" charset="0"/>
+                <a:cs typeface="Times New Roman" panose="02020603050405020304" pitchFamily="18" charset="0"/>
+              </a:rPr>
+              <a:t>SELIC</a:t>
+            </a:r>
+          </a:p>
+        </p:txBody>
+      </p:sp>
+      <p:sp>
+        <p:nvSpPr>
+          <p:cNvPr id="5" name="Retângulo 4">
+            <a:extLst>
+              <a:ext uri="{FF2B5EF4-FFF2-40B4-BE49-F238E27FC236}">
+                <a16:creationId xmlns:a16="http://schemas.microsoft.com/office/drawing/2014/main" id="{6A164F9F-A9E0-4AEA-9B03-9A5D42CEDA3D}"/>
+              </a:ext>
+            </a:extLst>
+          </p:cNvPr>
+          <p:cNvSpPr/>
+          <p:nvPr/>
+        </p:nvSpPr>
+        <p:spPr>
+          <a:xfrm>
+            <a:off x="2197079" y="3433160"/>
+            <a:ext cx="2880320" cy="914400"/>
+          </a:xfrm>
+          <a:prstGeom prst="rect">
+            <a:avLst/>
+          </a:prstGeom>
+          <a:solidFill>
+            <a:srgbClr val="704441"/>
+          </a:solidFill>
+          <a:ln>
+            <a:noFill/>
+          </a:ln>
+        </p:spPr>
+        <p:style>
+          <a:lnRef idx="2">
+            <a:schemeClr val="accent1">
+              <a:shade val="50000"/>
+            </a:schemeClr>
+          </a:lnRef>
+          <a:fillRef idx="1">
+            <a:schemeClr val="accent1"/>
+          </a:fillRef>
+          <a:effectRef idx="0">
+            <a:schemeClr val="accent1"/>
+          </a:effectRef>
+          <a:fontRef idx="minor">
+            <a:schemeClr val="lt1"/>
+          </a:fontRef>
+        </p:style>
+        <p:txBody>
+          <a:bodyPr rtlCol="0" anchor="ctr"/>
+          <a:lstStyle/>
+          <a:p>
+            <a:pPr algn="ctr"/>
+            <a:r>
+              <a:rPr lang="pt-BR" sz="2400" dirty="0">
+                <a:latin typeface="Times New Roman" panose="02020603050405020304" pitchFamily="18" charset="0"/>
+                <a:cs typeface="Times New Roman" panose="02020603050405020304" pitchFamily="18" charset="0"/>
+              </a:rPr>
+              <a:t>OPERAÇÕES DE CAPITAÇÃO</a:t>
+            </a:r>
+          </a:p>
+        </p:txBody>
+      </p:sp>
+      <p:sp>
+        <p:nvSpPr>
+          <p:cNvPr id="6" name="Retângulo 5">
+            <a:extLst>
+              <a:ext uri="{FF2B5EF4-FFF2-40B4-BE49-F238E27FC236}">
+                <a16:creationId xmlns:a16="http://schemas.microsoft.com/office/drawing/2014/main" id="{79358EB3-CA6D-4830-8D03-2E227959F05A}"/>
+              </a:ext>
+            </a:extLst>
+          </p:cNvPr>
+          <p:cNvSpPr/>
+          <p:nvPr/>
+        </p:nvSpPr>
+        <p:spPr>
+          <a:xfrm>
+            <a:off x="2197079" y="2161864"/>
+            <a:ext cx="2880320" cy="914400"/>
+          </a:xfrm>
+          <a:prstGeom prst="rect">
+            <a:avLst/>
+          </a:prstGeom>
+          <a:solidFill>
+            <a:srgbClr val="704441"/>
+          </a:solidFill>
+          <a:ln>
+            <a:noFill/>
+          </a:ln>
+        </p:spPr>
+        <p:style>
+          <a:lnRef idx="2">
+            <a:schemeClr val="accent1">
+              <a:shade val="50000"/>
+            </a:schemeClr>
+          </a:lnRef>
+          <a:fillRef idx="1">
+            <a:schemeClr val="accent1"/>
+          </a:fillRef>
+          <a:effectRef idx="0">
+            <a:schemeClr val="accent1"/>
+          </a:effectRef>
+          <a:fontRef idx="minor">
+            <a:schemeClr val="lt1"/>
+          </a:fontRef>
+        </p:style>
+        <p:txBody>
+          <a:bodyPr rtlCol="0" anchor="ctr"/>
+          <a:lstStyle/>
+          <a:p>
+            <a:pPr algn="ctr"/>
+            <a:r>
+              <a:rPr lang="pt-BR" sz="2400" dirty="0">
+                <a:latin typeface="Times New Roman" panose="02020603050405020304" pitchFamily="18" charset="0"/>
+                <a:cs typeface="Times New Roman" panose="02020603050405020304" pitchFamily="18" charset="0"/>
+              </a:rPr>
+              <a:t>DI</a:t>
+            </a:r>
+          </a:p>
+        </p:txBody>
+      </p:sp>
+      <p:sp>
+        <p:nvSpPr>
+          <p:cNvPr id="7" name="Retângulo 6">
+            <a:extLst>
+              <a:ext uri="{FF2B5EF4-FFF2-40B4-BE49-F238E27FC236}">
+                <a16:creationId xmlns:a16="http://schemas.microsoft.com/office/drawing/2014/main" id="{52BD7606-FC6E-4E08-BDAA-F70E5689382B}"/>
+              </a:ext>
+            </a:extLst>
+          </p:cNvPr>
+          <p:cNvSpPr/>
+          <p:nvPr/>
+        </p:nvSpPr>
+        <p:spPr>
+          <a:xfrm>
+            <a:off x="2197079" y="4703814"/>
+            <a:ext cx="2880320" cy="914400"/>
+          </a:xfrm>
+          <a:prstGeom prst="rect">
+            <a:avLst/>
+          </a:prstGeom>
+          <a:solidFill>
+            <a:srgbClr val="704441"/>
+          </a:solidFill>
+          <a:ln>
+            <a:noFill/>
+          </a:ln>
+        </p:spPr>
+        <p:style>
+          <a:lnRef idx="2">
+            <a:schemeClr val="accent1">
+              <a:shade val="50000"/>
+            </a:schemeClr>
+          </a:lnRef>
+          <a:fillRef idx="1">
+            <a:schemeClr val="accent1"/>
+          </a:fillRef>
+          <a:effectRef idx="0">
+            <a:schemeClr val="accent1"/>
+          </a:effectRef>
+          <a:fontRef idx="minor">
+            <a:schemeClr val="lt1"/>
+          </a:fontRef>
+        </p:style>
+        <p:txBody>
+          <a:bodyPr rtlCol="0" anchor="ctr"/>
+          <a:lstStyle/>
+          <a:p>
+            <a:pPr algn="ctr"/>
+            <a:r>
+              <a:rPr lang="pt-BR" sz="2400" dirty="0">
+                <a:latin typeface="Times New Roman" panose="02020603050405020304" pitchFamily="18" charset="0"/>
+                <a:cs typeface="Times New Roman" panose="02020603050405020304" pitchFamily="18" charset="0"/>
+              </a:rPr>
+              <a:t>OPERAÇÕES DE EMPRÉSTIMOS</a:t>
+            </a:r>
+          </a:p>
+        </p:txBody>
+      </p:sp>
+      <p:cxnSp>
+        <p:nvCxnSpPr>
+          <p:cNvPr id="8" name="Conector de Seta Reta 7">
+            <a:extLst>
+              <a:ext uri="{FF2B5EF4-FFF2-40B4-BE49-F238E27FC236}">
+                <a16:creationId xmlns:a16="http://schemas.microsoft.com/office/drawing/2014/main" id="{A2560412-A0FF-4515-9F63-E99992E4E23C}"/>
+              </a:ext>
+            </a:extLst>
+          </p:cNvPr>
+          <p:cNvCxnSpPr>
+            <a:cxnSpLocks/>
+            <a:stCxn id="4" idx="2"/>
+            <a:endCxn id="6" idx="0"/>
+          </p:cNvCxnSpPr>
+          <p:nvPr/>
+        </p:nvCxnSpPr>
+        <p:spPr>
+          <a:xfrm>
+            <a:off x="3637239" y="1804968"/>
+            <a:ext cx="0" cy="356896"/>
+          </a:xfrm>
+          <a:prstGeom prst="straightConnector1">
+            <a:avLst/>
+          </a:prstGeom>
+          <a:ln w="38100">
+            <a:solidFill>
+              <a:srgbClr val="704441"/>
+            </a:solidFill>
+            <a:tailEnd type="triangle"/>
+          </a:ln>
+        </p:spPr>
+        <p:style>
+          <a:lnRef idx="1">
+            <a:schemeClr val="accent1"/>
+          </a:lnRef>
+          <a:fillRef idx="0">
+            <a:schemeClr val="accent1"/>
+          </a:fillRef>
+          <a:effectRef idx="0">
+            <a:schemeClr val="accent1"/>
+          </a:effectRef>
+          <a:fontRef idx="minor">
+            <a:schemeClr val="tx1"/>
+          </a:fontRef>
+        </p:style>
+      </p:cxnSp>
+      <p:cxnSp>
+        <p:nvCxnSpPr>
+          <p:cNvPr id="9" name="Conector de Seta Reta 8">
+            <a:extLst>
+              <a:ext uri="{FF2B5EF4-FFF2-40B4-BE49-F238E27FC236}">
+                <a16:creationId xmlns:a16="http://schemas.microsoft.com/office/drawing/2014/main" id="{30887B67-BB88-4561-895D-DBFD69687FEF}"/>
+              </a:ext>
+            </a:extLst>
+          </p:cNvPr>
+          <p:cNvCxnSpPr>
+            <a:cxnSpLocks/>
+            <a:stCxn id="6" idx="2"/>
+            <a:endCxn id="5" idx="0"/>
+          </p:cNvCxnSpPr>
+          <p:nvPr/>
+        </p:nvCxnSpPr>
+        <p:spPr>
+          <a:xfrm>
+            <a:off x="3637239" y="3076264"/>
+            <a:ext cx="0" cy="356896"/>
+          </a:xfrm>
+          <a:prstGeom prst="straightConnector1">
+            <a:avLst/>
+          </a:prstGeom>
+          <a:ln w="38100">
+            <a:solidFill>
+              <a:srgbClr val="704441"/>
+            </a:solidFill>
+            <a:tailEnd type="triangle"/>
+          </a:ln>
+        </p:spPr>
+        <p:style>
+          <a:lnRef idx="1">
+            <a:schemeClr val="accent1"/>
+          </a:lnRef>
+          <a:fillRef idx="0">
+            <a:schemeClr val="accent1"/>
+          </a:fillRef>
+          <a:effectRef idx="0">
+            <a:schemeClr val="accent1"/>
+          </a:effectRef>
+          <a:fontRef idx="minor">
+            <a:schemeClr val="tx1"/>
+          </a:fontRef>
+        </p:style>
+      </p:cxnSp>
+      <p:cxnSp>
+        <p:nvCxnSpPr>
+          <p:cNvPr id="10" name="Conector de Seta Reta 9">
+            <a:extLst>
+              <a:ext uri="{FF2B5EF4-FFF2-40B4-BE49-F238E27FC236}">
+                <a16:creationId xmlns:a16="http://schemas.microsoft.com/office/drawing/2014/main" id="{119AD8AB-BA78-45E3-9C50-00DE8D2B2773}"/>
+              </a:ext>
+            </a:extLst>
+          </p:cNvPr>
+          <p:cNvCxnSpPr>
+            <a:cxnSpLocks/>
+            <a:stCxn id="5" idx="2"/>
+            <a:endCxn id="7" idx="0"/>
+          </p:cNvCxnSpPr>
+          <p:nvPr/>
+        </p:nvCxnSpPr>
+        <p:spPr>
+          <a:xfrm>
+            <a:off x="3637239" y="4347560"/>
+            <a:ext cx="0" cy="356254"/>
+          </a:xfrm>
+          <a:prstGeom prst="straightConnector1">
+            <a:avLst/>
+          </a:prstGeom>
+          <a:ln w="38100">
+            <a:solidFill>
+              <a:srgbClr val="704441"/>
+            </a:solidFill>
+            <a:tailEnd type="triangle"/>
+          </a:ln>
+        </p:spPr>
+        <p:style>
+          <a:lnRef idx="1">
+            <a:schemeClr val="accent1"/>
+          </a:lnRef>
+          <a:fillRef idx="0">
+            <a:schemeClr val="accent1"/>
+          </a:fillRef>
+          <a:effectRef idx="0">
+            <a:schemeClr val="accent1"/>
+          </a:effectRef>
+          <a:fontRef idx="minor">
+            <a:schemeClr val="tx1"/>
+          </a:fontRef>
+        </p:style>
+      </p:cxnSp>
+      <p:cxnSp>
+        <p:nvCxnSpPr>
+          <p:cNvPr id="11" name="Conector de Seta Reta 10">
+            <a:extLst>
+              <a:ext uri="{FF2B5EF4-FFF2-40B4-BE49-F238E27FC236}">
+                <a16:creationId xmlns:a16="http://schemas.microsoft.com/office/drawing/2014/main" id="{5FC6BF36-3740-4C52-9E00-ED087B9D3F0B}"/>
+              </a:ext>
+            </a:extLst>
+          </p:cNvPr>
+          <p:cNvCxnSpPr>
+            <a:cxnSpLocks/>
+            <a:stCxn id="4" idx="3"/>
+            <a:endCxn id="15" idx="1"/>
+          </p:cNvCxnSpPr>
+          <p:nvPr/>
+        </p:nvCxnSpPr>
+        <p:spPr>
+          <a:xfrm>
+            <a:off x="5077399" y="1347768"/>
+            <a:ext cx="579622" cy="4170"/>
+          </a:xfrm>
+          <a:prstGeom prst="straightConnector1">
+            <a:avLst/>
+          </a:prstGeom>
+          <a:ln w="57150">
+            <a:solidFill>
+              <a:srgbClr val="1EA674"/>
+            </a:solidFill>
+            <a:tailEnd type="triangle"/>
+          </a:ln>
+        </p:spPr>
+        <p:style>
+          <a:lnRef idx="1">
+            <a:schemeClr val="accent1"/>
+          </a:lnRef>
+          <a:fillRef idx="0">
+            <a:schemeClr val="accent1"/>
+          </a:fillRef>
+          <a:effectRef idx="0">
+            <a:schemeClr val="accent1"/>
+          </a:effectRef>
+          <a:fontRef idx="minor">
+            <a:schemeClr val="tx1"/>
+          </a:fontRef>
+        </p:style>
+      </p:cxnSp>
+      <p:cxnSp>
+        <p:nvCxnSpPr>
+          <p:cNvPr id="12" name="Conector de Seta Reta 11">
+            <a:extLst>
+              <a:ext uri="{FF2B5EF4-FFF2-40B4-BE49-F238E27FC236}">
+                <a16:creationId xmlns:a16="http://schemas.microsoft.com/office/drawing/2014/main" id="{23ACB231-6E1B-417E-89B5-95569521CE03}"/>
+              </a:ext>
+            </a:extLst>
+          </p:cNvPr>
+          <p:cNvCxnSpPr>
+            <a:cxnSpLocks/>
+            <a:stCxn id="6" idx="3"/>
+            <a:endCxn id="16" idx="1"/>
+          </p:cNvCxnSpPr>
+          <p:nvPr/>
+        </p:nvCxnSpPr>
+        <p:spPr>
+          <a:xfrm>
+            <a:off x="5077399" y="2619064"/>
+            <a:ext cx="579621" cy="0"/>
+          </a:xfrm>
+          <a:prstGeom prst="straightConnector1">
+            <a:avLst/>
+          </a:prstGeom>
+          <a:ln w="57150">
+            <a:solidFill>
+              <a:srgbClr val="1EA674"/>
+            </a:solidFill>
+            <a:tailEnd type="triangle"/>
+          </a:ln>
+        </p:spPr>
+        <p:style>
+          <a:lnRef idx="1">
+            <a:schemeClr val="accent1"/>
+          </a:lnRef>
+          <a:fillRef idx="0">
+            <a:schemeClr val="accent1"/>
+          </a:fillRef>
+          <a:effectRef idx="0">
+            <a:schemeClr val="accent1"/>
+          </a:effectRef>
+          <a:fontRef idx="minor">
+            <a:schemeClr val="tx1"/>
+          </a:fontRef>
+        </p:style>
+      </p:cxnSp>
+      <p:cxnSp>
+        <p:nvCxnSpPr>
+          <p:cNvPr id="13" name="Conector de Seta Reta 12">
+            <a:extLst>
+              <a:ext uri="{FF2B5EF4-FFF2-40B4-BE49-F238E27FC236}">
+                <a16:creationId xmlns:a16="http://schemas.microsoft.com/office/drawing/2014/main" id="{BDE6ECF9-B0AC-4CFE-BDDC-F483511FDE47}"/>
+              </a:ext>
+            </a:extLst>
+          </p:cNvPr>
+          <p:cNvCxnSpPr>
+            <a:cxnSpLocks/>
+            <a:stCxn id="5" idx="3"/>
+            <a:endCxn id="17" idx="1"/>
+          </p:cNvCxnSpPr>
+          <p:nvPr/>
+        </p:nvCxnSpPr>
+        <p:spPr>
+          <a:xfrm>
+            <a:off x="5077399" y="3890360"/>
+            <a:ext cx="579620" cy="3528"/>
+          </a:xfrm>
+          <a:prstGeom prst="straightConnector1">
+            <a:avLst/>
+          </a:prstGeom>
+          <a:ln w="57150">
+            <a:solidFill>
+              <a:srgbClr val="1EA674"/>
+            </a:solidFill>
+            <a:tailEnd type="triangle"/>
+          </a:ln>
+        </p:spPr>
+        <p:style>
+          <a:lnRef idx="1">
+            <a:schemeClr val="accent1"/>
+          </a:lnRef>
+          <a:fillRef idx="0">
+            <a:schemeClr val="accent1"/>
+          </a:fillRef>
+          <a:effectRef idx="0">
+            <a:schemeClr val="accent1"/>
+          </a:effectRef>
+          <a:fontRef idx="minor">
+            <a:schemeClr val="tx1"/>
+          </a:fontRef>
+        </p:style>
+      </p:cxnSp>
+      <p:cxnSp>
+        <p:nvCxnSpPr>
+          <p:cNvPr id="14" name="Conector de Seta Reta 13">
+            <a:extLst>
+              <a:ext uri="{FF2B5EF4-FFF2-40B4-BE49-F238E27FC236}">
+                <a16:creationId xmlns:a16="http://schemas.microsoft.com/office/drawing/2014/main" id="{0792B248-C367-4DC0-A370-42BF3CC2AF06}"/>
+              </a:ext>
+            </a:extLst>
+          </p:cNvPr>
+          <p:cNvCxnSpPr>
+            <a:cxnSpLocks/>
+            <a:stCxn id="7" idx="3"/>
+            <a:endCxn id="18" idx="1"/>
+          </p:cNvCxnSpPr>
+          <p:nvPr/>
+        </p:nvCxnSpPr>
+        <p:spPr>
+          <a:xfrm>
+            <a:off x="5077399" y="5161014"/>
+            <a:ext cx="579620" cy="0"/>
+          </a:xfrm>
+          <a:prstGeom prst="straightConnector1">
+            <a:avLst/>
+          </a:prstGeom>
+          <a:ln w="57150">
+            <a:solidFill>
+              <a:srgbClr val="1EA674"/>
+            </a:solidFill>
+            <a:tailEnd type="triangle"/>
+          </a:ln>
+        </p:spPr>
+        <p:style>
+          <a:lnRef idx="1">
+            <a:schemeClr val="accent1"/>
+          </a:lnRef>
+          <a:fillRef idx="0">
+            <a:schemeClr val="accent1"/>
+          </a:fillRef>
+          <a:effectRef idx="0">
+            <a:schemeClr val="accent1"/>
+          </a:effectRef>
+          <a:fontRef idx="minor">
+            <a:schemeClr val="tx1"/>
+          </a:fontRef>
+        </p:style>
+      </p:cxnSp>
+      <p:sp>
+        <p:nvSpPr>
+          <p:cNvPr id="15" name="Retângulo 14">
+            <a:extLst>
+              <a:ext uri="{FF2B5EF4-FFF2-40B4-BE49-F238E27FC236}">
+                <a16:creationId xmlns:a16="http://schemas.microsoft.com/office/drawing/2014/main" id="{7EB2C17E-C7B9-4325-B4B5-57BC09DD3A75}"/>
+              </a:ext>
+            </a:extLst>
+          </p:cNvPr>
+          <p:cNvSpPr/>
+          <p:nvPr/>
+        </p:nvSpPr>
+        <p:spPr>
+          <a:xfrm>
+            <a:off x="5657021" y="822882"/>
+            <a:ext cx="4160758" cy="1058111"/>
+          </a:xfrm>
+          <a:prstGeom prst="rect">
+            <a:avLst/>
+          </a:prstGeom>
+          <a:solidFill>
+            <a:srgbClr val="1EA674"/>
+          </a:solidFill>
+          <a:ln>
+            <a:solidFill>
+              <a:srgbClr val="1EA674"/>
+            </a:solidFill>
+          </a:ln>
+        </p:spPr>
+        <p:style>
+          <a:lnRef idx="2">
+            <a:schemeClr val="accent1">
+              <a:shade val="50000"/>
+            </a:schemeClr>
+          </a:lnRef>
+          <a:fillRef idx="1">
+            <a:schemeClr val="accent1"/>
+          </a:fillRef>
+          <a:effectRef idx="0">
+            <a:schemeClr val="accent1"/>
+          </a:effectRef>
+          <a:fontRef idx="minor">
+            <a:schemeClr val="lt1"/>
+          </a:fontRef>
+        </p:style>
+        <p:txBody>
+          <a:bodyPr rtlCol="0" anchor="ctr"/>
+          <a:lstStyle/>
+          <a:p>
+            <a:pPr algn="ctr"/>
+            <a:r>
+              <a:rPr lang="pt-BR" sz="2400" dirty="0">
+                <a:latin typeface="Times New Roman" panose="02020603050405020304" pitchFamily="18" charset="0"/>
+                <a:cs typeface="Times New Roman" panose="02020603050405020304" pitchFamily="18" charset="0"/>
+              </a:rPr>
+              <a:t>Taxa de juros (rentabilidade) dos títulos públicos e taxa de redesconto. </a:t>
+            </a:r>
+          </a:p>
+        </p:txBody>
+      </p:sp>
+      <p:sp>
+        <p:nvSpPr>
+          <p:cNvPr id="16" name="Retângulo 15">
+            <a:extLst>
+              <a:ext uri="{FF2B5EF4-FFF2-40B4-BE49-F238E27FC236}">
+                <a16:creationId xmlns:a16="http://schemas.microsoft.com/office/drawing/2014/main" id="{A0F75B22-EA42-40CD-9C02-B9FFAB7F4DB9}"/>
+              </a:ext>
+            </a:extLst>
+          </p:cNvPr>
+          <p:cNvSpPr/>
+          <p:nvPr/>
+        </p:nvSpPr>
+        <p:spPr>
+          <a:xfrm>
+            <a:off x="5657020" y="2090008"/>
+            <a:ext cx="4160758" cy="1058111"/>
+          </a:xfrm>
+          <a:prstGeom prst="rect">
+            <a:avLst/>
+          </a:prstGeom>
+          <a:solidFill>
+            <a:srgbClr val="1EA674"/>
+          </a:solidFill>
+          <a:ln>
+            <a:solidFill>
+              <a:srgbClr val="1EA674"/>
+            </a:solidFill>
+          </a:ln>
+        </p:spPr>
+        <p:style>
+          <a:lnRef idx="2">
+            <a:schemeClr val="accent1">
+              <a:shade val="50000"/>
+            </a:schemeClr>
+          </a:lnRef>
+          <a:fillRef idx="1">
+            <a:schemeClr val="accent1"/>
+          </a:fillRef>
+          <a:effectRef idx="0">
+            <a:schemeClr val="accent1"/>
+          </a:effectRef>
+          <a:fontRef idx="minor">
+            <a:schemeClr val="lt1"/>
+          </a:fontRef>
+        </p:style>
+        <p:txBody>
+          <a:bodyPr rtlCol="0" anchor="ctr"/>
+          <a:lstStyle/>
+          <a:p>
+            <a:pPr algn="ctr"/>
+            <a:r>
+              <a:rPr lang="pt-BR" sz="2400" dirty="0">
+                <a:latin typeface="Times New Roman" panose="02020603050405020304" pitchFamily="18" charset="0"/>
+                <a:cs typeface="Times New Roman" panose="02020603050405020304" pitchFamily="18" charset="0"/>
+              </a:rPr>
+              <a:t>Taxa de juros de empréstimos interbancários (CDI).</a:t>
+            </a:r>
+          </a:p>
+        </p:txBody>
+      </p:sp>
+      <p:sp>
+        <p:nvSpPr>
+          <p:cNvPr id="17" name="Retângulo 16">
+            <a:extLst>
+              <a:ext uri="{FF2B5EF4-FFF2-40B4-BE49-F238E27FC236}">
+                <a16:creationId xmlns:a16="http://schemas.microsoft.com/office/drawing/2014/main" id="{06422B61-7E15-4BAB-A646-F6843A1152DF}"/>
+              </a:ext>
+            </a:extLst>
+          </p:cNvPr>
+          <p:cNvSpPr/>
+          <p:nvPr/>
+        </p:nvSpPr>
+        <p:spPr>
+          <a:xfrm>
+            <a:off x="5657019" y="3364832"/>
+            <a:ext cx="4160758" cy="1058111"/>
+          </a:xfrm>
+          <a:prstGeom prst="rect">
+            <a:avLst/>
+          </a:prstGeom>
+          <a:solidFill>
+            <a:srgbClr val="1EA674"/>
+          </a:solidFill>
+          <a:ln>
+            <a:solidFill>
+              <a:srgbClr val="1EA674"/>
+            </a:solidFill>
+          </a:ln>
+        </p:spPr>
+        <p:style>
+          <a:lnRef idx="2">
+            <a:schemeClr val="accent1">
+              <a:shade val="50000"/>
+            </a:schemeClr>
+          </a:lnRef>
+          <a:fillRef idx="1">
+            <a:schemeClr val="accent1"/>
+          </a:fillRef>
+          <a:effectRef idx="0">
+            <a:schemeClr val="accent1"/>
+          </a:effectRef>
+          <a:fontRef idx="minor">
+            <a:schemeClr val="lt1"/>
+          </a:fontRef>
+        </p:style>
+        <p:txBody>
+          <a:bodyPr rtlCol="0" anchor="ctr"/>
+          <a:lstStyle/>
+          <a:p>
+            <a:pPr algn="ctr"/>
+            <a:r>
+              <a:rPr lang="pt-BR" sz="2400" dirty="0">
+                <a:latin typeface="Times New Roman" panose="02020603050405020304" pitchFamily="18" charset="0"/>
+                <a:cs typeface="Times New Roman" panose="02020603050405020304" pitchFamily="18" charset="0"/>
+              </a:rPr>
+              <a:t>Taxa de juros rentabilidade de títulos bancários (CDB).</a:t>
+            </a:r>
+          </a:p>
+        </p:txBody>
+      </p:sp>
+      <p:sp>
+        <p:nvSpPr>
+          <p:cNvPr id="18" name="Retângulo 17">
+            <a:extLst>
+              <a:ext uri="{FF2B5EF4-FFF2-40B4-BE49-F238E27FC236}">
+                <a16:creationId xmlns:a16="http://schemas.microsoft.com/office/drawing/2014/main" id="{4E56005F-D994-464B-8E1F-C4B6DFAF151E}"/>
+              </a:ext>
+            </a:extLst>
+          </p:cNvPr>
+          <p:cNvSpPr/>
+          <p:nvPr/>
+        </p:nvSpPr>
+        <p:spPr>
+          <a:xfrm>
+            <a:off x="5657019" y="4631958"/>
+            <a:ext cx="4160758" cy="1058111"/>
+          </a:xfrm>
+          <a:prstGeom prst="rect">
+            <a:avLst/>
+          </a:prstGeom>
+          <a:solidFill>
+            <a:srgbClr val="1EA674"/>
+          </a:solidFill>
+          <a:ln>
+            <a:solidFill>
+              <a:srgbClr val="1EA674"/>
+            </a:solidFill>
+          </a:ln>
+        </p:spPr>
+        <p:style>
+          <a:lnRef idx="2">
+            <a:schemeClr val="accent1">
+              <a:shade val="50000"/>
+            </a:schemeClr>
+          </a:lnRef>
+          <a:fillRef idx="1">
+            <a:schemeClr val="accent1"/>
+          </a:fillRef>
+          <a:effectRef idx="0">
+            <a:schemeClr val="accent1"/>
+          </a:effectRef>
+          <a:fontRef idx="minor">
+            <a:schemeClr val="lt1"/>
+          </a:fontRef>
+        </p:style>
+        <p:txBody>
+          <a:bodyPr rtlCol="0" anchor="ctr"/>
+          <a:lstStyle/>
+          <a:p>
+            <a:pPr algn="ctr"/>
+            <a:r>
+              <a:rPr lang="pt-BR" sz="2400" dirty="0">
+                <a:latin typeface="Times New Roman" panose="02020603050405020304" pitchFamily="18" charset="0"/>
+                <a:cs typeface="Times New Roman" panose="02020603050405020304" pitchFamily="18" charset="0"/>
+              </a:rPr>
+              <a:t>Taxa de juros de operações de crédito.</a:t>
+            </a:r>
+          </a:p>
+        </p:txBody>
+      </p:sp>
+      <p:sp>
+        <p:nvSpPr>
+          <p:cNvPr id="19" name="Chave Direita 18">
+            <a:extLst>
+              <a:ext uri="{FF2B5EF4-FFF2-40B4-BE49-F238E27FC236}">
+                <a16:creationId xmlns:a16="http://schemas.microsoft.com/office/drawing/2014/main" id="{2D2A752C-1AA5-431D-8B70-B362093A75BA}"/>
+              </a:ext>
+            </a:extLst>
+          </p:cNvPr>
+          <p:cNvSpPr/>
+          <p:nvPr/>
+        </p:nvSpPr>
+        <p:spPr>
+          <a:xfrm>
+            <a:off x="9817777" y="3886188"/>
+            <a:ext cx="228089" cy="1282521"/>
+          </a:xfrm>
+          <a:prstGeom prst="rightBrace">
+            <a:avLst/>
+          </a:prstGeom>
+          <a:ln w="57150">
+            <a:solidFill>
+              <a:srgbClr val="E0C240"/>
+            </a:solidFill>
+          </a:ln>
+        </p:spPr>
+        <p:style>
+          <a:lnRef idx="1">
+            <a:schemeClr val="accent1"/>
+          </a:lnRef>
+          <a:fillRef idx="0">
+            <a:schemeClr val="accent1"/>
+          </a:fillRef>
+          <a:effectRef idx="0">
+            <a:schemeClr val="accent1"/>
+          </a:effectRef>
+          <a:fontRef idx="minor">
+            <a:schemeClr val="tx1"/>
+          </a:fontRef>
+        </p:style>
+        <p:txBody>
+          <a:bodyPr rtlCol="0" anchor="ctr"/>
+          <a:lstStyle/>
+          <a:p>
+            <a:pPr algn="ctr"/>
+            <a:endParaRPr lang="pt-BR"/>
+          </a:p>
+        </p:txBody>
+      </p:sp>
+      <p:sp>
+        <p:nvSpPr>
+          <p:cNvPr id="20" name="CaixaDeTexto 19">
+            <a:extLst>
+              <a:ext uri="{FF2B5EF4-FFF2-40B4-BE49-F238E27FC236}">
+                <a16:creationId xmlns:a16="http://schemas.microsoft.com/office/drawing/2014/main" id="{F2C29A6B-0E77-465E-A268-A23DFB9C19B0}"/>
+              </a:ext>
+            </a:extLst>
+          </p:cNvPr>
+          <p:cNvSpPr txBox="1"/>
+          <p:nvPr/>
+        </p:nvSpPr>
+        <p:spPr>
+          <a:xfrm>
+            <a:off x="10303390" y="3289675"/>
+            <a:ext cx="582211" cy="2472023"/>
+          </a:xfrm>
+          <a:prstGeom prst="rect">
+            <a:avLst/>
+          </a:prstGeom>
+          <a:noFill/>
+          <a:ln w="28575">
+            <a:solidFill>
+              <a:srgbClr val="E0C240"/>
+            </a:solidFill>
+          </a:ln>
+        </p:spPr>
+        <p:txBody>
+          <a:bodyPr vert="wordArtVert" wrap="none" rtlCol="0">
+            <a:spAutoFit/>
+          </a:bodyPr>
+          <a:lstStyle/>
+          <a:p>
+            <a:r>
+              <a:rPr lang="pt-BR" sz="2400" b="1" dirty="0">
+                <a:latin typeface="Times New Roman" panose="02020603050405020304" pitchFamily="18" charset="0"/>
+                <a:cs typeface="Times New Roman" panose="02020603050405020304" pitchFamily="18" charset="0"/>
+              </a:rPr>
+              <a:t>Spread</a:t>
+            </a:r>
+          </a:p>
+        </p:txBody>
+      </p:sp>
+    </p:spTree>
+    <p:extLst>
+      <p:ext uri="{BB962C8B-B14F-4D97-AF65-F5344CB8AC3E}">
+        <p14:creationId xmlns:p14="http://schemas.microsoft.com/office/powerpoint/2010/main" val="1927994011"/>
+      </p:ext>
+    </p:extLst>
+  </p:cSld>
+  <p:clrMapOvr>
+    <a:masterClrMapping/>
+  </p:clrMapOvr>
+  <p:timing>
+    <p:tnLst>
+      <p:par>
+        <p:cTn id="1" dur="indefinite" restart="never" nodeType="tmRoot">
+          <p:childTnLst>
+            <p:seq concurrent="1" nextAc="seek">
+              <p:cTn id="2" dur="indefinite" nodeType="mainSeq">
+                <p:childTnLst>
+                  <p:par>
+                    <p:cTn id="3" fill="hold">
+                      <p:stCondLst>
+                        <p:cond delay="indefinite"/>
+                      </p:stCondLst>
+                      <p:childTnLst>
+                        <p:par>
+                          <p:cTn id="4" fill="hold">
+                            <p:stCondLst>
+                              <p:cond delay="0"/>
+                            </p:stCondLst>
+                            <p:childTnLst>
+                              <p:par>
+                                <p:cTn id="5" presetID="2" presetClass="entr" presetSubtype="4" fill="hold" nodeType="clickEffect">
+                                  <p:stCondLst>
+                                    <p:cond delay="0"/>
+                                  </p:stCondLst>
+                                  <p:childTnLst>
+                                    <p:set>
+                                      <p:cBhvr>
+                                        <p:cTn id="6" dur="1" fill="hold">
+                                          <p:stCondLst>
+                                            <p:cond delay="0"/>
+                                          </p:stCondLst>
+                                        </p:cTn>
+                                        <p:tgtEl>
+                                          <p:spTgt spid="11"/>
+                                        </p:tgtEl>
+                                        <p:attrNameLst>
+                                          <p:attrName>style.visibility</p:attrName>
+                                        </p:attrNameLst>
+                                      </p:cBhvr>
+                                      <p:to>
+                                        <p:strVal val="visible"/>
+                                      </p:to>
+                                    </p:set>
+                                    <p:anim calcmode="lin" valueType="num">
+                                      <p:cBhvr additive="base">
+                                        <p:cTn id="7" dur="500" fill="hold"/>
+                                        <p:tgtEl>
+                                          <p:spTgt spid="11"/>
+                                        </p:tgtEl>
+                                        <p:attrNameLst>
+                                          <p:attrName>ppt_x</p:attrName>
+                                        </p:attrNameLst>
+                                      </p:cBhvr>
+                                      <p:tavLst>
+                                        <p:tav tm="0">
+                                          <p:val>
+                                            <p:strVal val="#ppt_x"/>
+                                          </p:val>
+                                        </p:tav>
+                                        <p:tav tm="100000">
+                                          <p:val>
+                                            <p:strVal val="#ppt_x"/>
+                                          </p:val>
+                                        </p:tav>
+                                      </p:tavLst>
+                                    </p:anim>
+                                    <p:anim calcmode="lin" valueType="num">
+                                      <p:cBhvr additive="base">
+                                        <p:cTn id="8" dur="500" fill="hold"/>
+                                        <p:tgtEl>
+                                          <p:spTgt spid="11"/>
+                                        </p:tgtEl>
+                                        <p:attrNameLst>
+                                          <p:attrName>ppt_y</p:attrName>
+                                        </p:attrNameLst>
+                                      </p:cBhvr>
+                                      <p:tavLst>
+                                        <p:tav tm="0">
+                                          <p:val>
+                                            <p:strVal val="1+#ppt_h/2"/>
+                                          </p:val>
+                                        </p:tav>
+                                        <p:tav tm="100000">
+                                          <p:val>
+                                            <p:strVal val="#ppt_y"/>
+                                          </p:val>
+                                        </p:tav>
+                                      </p:tavLst>
+                                    </p:anim>
+                                  </p:childTnLst>
+                                </p:cTn>
+                              </p:par>
+                              <p:par>
+                                <p:cTn id="9" presetID="2" presetClass="entr" presetSubtype="4" fill="hold" grpId="0" nodeType="withEffect">
+                                  <p:stCondLst>
+                                    <p:cond delay="0"/>
+                                  </p:stCondLst>
+                                  <p:childTnLst>
+                                    <p:set>
+                                      <p:cBhvr>
+                                        <p:cTn id="10" dur="1" fill="hold">
+                                          <p:stCondLst>
+                                            <p:cond delay="0"/>
+                                          </p:stCondLst>
+                                        </p:cTn>
+                                        <p:tgtEl>
+                                          <p:spTgt spid="15"/>
+                                        </p:tgtEl>
+                                        <p:attrNameLst>
+                                          <p:attrName>style.visibility</p:attrName>
+                                        </p:attrNameLst>
+                                      </p:cBhvr>
+                                      <p:to>
+                                        <p:strVal val="visible"/>
+                                      </p:to>
+                                    </p:set>
+                                    <p:anim calcmode="lin" valueType="num">
+                                      <p:cBhvr additive="base">
+                                        <p:cTn id="11" dur="500" fill="hold"/>
+                                        <p:tgtEl>
+                                          <p:spTgt spid="15"/>
+                                        </p:tgtEl>
+                                        <p:attrNameLst>
+                                          <p:attrName>ppt_x</p:attrName>
+                                        </p:attrNameLst>
+                                      </p:cBhvr>
+                                      <p:tavLst>
+                                        <p:tav tm="0">
+                                          <p:val>
+                                            <p:strVal val="#ppt_x"/>
+                                          </p:val>
+                                        </p:tav>
+                                        <p:tav tm="100000">
+                                          <p:val>
+                                            <p:strVal val="#ppt_x"/>
+                                          </p:val>
+                                        </p:tav>
+                                      </p:tavLst>
+                                    </p:anim>
+                                    <p:anim calcmode="lin" valueType="num">
+                                      <p:cBhvr additive="base">
+                                        <p:cTn id="12" dur="500" fill="hold"/>
+                                        <p:tgtEl>
+                                          <p:spTgt spid="15"/>
+                                        </p:tgtEl>
+                                        <p:attrNameLst>
+                                          <p:attrName>ppt_y</p:attrName>
+                                        </p:attrNameLst>
+                                      </p:cBhvr>
+                                      <p:tavLst>
+                                        <p:tav tm="0">
+                                          <p:val>
+                                            <p:strVal val="1+#ppt_h/2"/>
+                                          </p:val>
+                                        </p:tav>
+                                        <p:tav tm="100000">
+                                          <p:val>
+                                            <p:strVal val="#ppt_y"/>
+                                          </p:val>
+                                        </p:tav>
+                                      </p:tavLst>
+                                    </p:anim>
+                                  </p:childTnLst>
+                                </p:cTn>
+                              </p:par>
+                            </p:childTnLst>
+                          </p:cTn>
+                        </p:par>
+                      </p:childTnLst>
+                    </p:cTn>
+                  </p:par>
+                  <p:par>
+                    <p:cTn id="13" fill="hold">
+                      <p:stCondLst>
+                        <p:cond delay="indefinite"/>
+                      </p:stCondLst>
+                      <p:childTnLst>
+                        <p:par>
+                          <p:cTn id="14" fill="hold">
+                            <p:stCondLst>
+                              <p:cond delay="0"/>
+                            </p:stCondLst>
+                            <p:childTnLst>
+                              <p:par>
+                                <p:cTn id="15" presetID="2" presetClass="entr" presetSubtype="4" fill="hold" nodeType="clickEffect">
+                                  <p:stCondLst>
+                                    <p:cond delay="0"/>
+                                  </p:stCondLst>
+                                  <p:childTnLst>
+                                    <p:set>
+                                      <p:cBhvr>
+                                        <p:cTn id="16" dur="1" fill="hold">
+                                          <p:stCondLst>
+                                            <p:cond delay="0"/>
+                                          </p:stCondLst>
+                                        </p:cTn>
+                                        <p:tgtEl>
+                                          <p:spTgt spid="8"/>
+                                        </p:tgtEl>
+                                        <p:attrNameLst>
+                                          <p:attrName>style.visibility</p:attrName>
+                                        </p:attrNameLst>
+                                      </p:cBhvr>
+                                      <p:to>
+                                        <p:strVal val="visible"/>
+                                      </p:to>
+                                    </p:set>
+                                    <p:anim calcmode="lin" valueType="num">
+                                      <p:cBhvr additive="base">
+                                        <p:cTn id="17" dur="500" fill="hold"/>
+                                        <p:tgtEl>
+                                          <p:spTgt spid="8"/>
+                                        </p:tgtEl>
+                                        <p:attrNameLst>
+                                          <p:attrName>ppt_x</p:attrName>
+                                        </p:attrNameLst>
+                                      </p:cBhvr>
+                                      <p:tavLst>
+                                        <p:tav tm="0">
+                                          <p:val>
+                                            <p:strVal val="#ppt_x"/>
+                                          </p:val>
+                                        </p:tav>
+                                        <p:tav tm="100000">
+                                          <p:val>
+                                            <p:strVal val="#ppt_x"/>
+                                          </p:val>
+                                        </p:tav>
+                                      </p:tavLst>
+                                    </p:anim>
+                                    <p:anim calcmode="lin" valueType="num">
+                                      <p:cBhvr additive="base">
+                                        <p:cTn id="18" dur="500" fill="hold"/>
+                                        <p:tgtEl>
+                                          <p:spTgt spid="8"/>
+                                        </p:tgtEl>
+                                        <p:attrNameLst>
+                                          <p:attrName>ppt_y</p:attrName>
+                                        </p:attrNameLst>
+                                      </p:cBhvr>
+                                      <p:tavLst>
+                                        <p:tav tm="0">
+                                          <p:val>
+                                            <p:strVal val="1+#ppt_h/2"/>
+                                          </p:val>
+                                        </p:tav>
+                                        <p:tav tm="100000">
+                                          <p:val>
+                                            <p:strVal val="#ppt_y"/>
+                                          </p:val>
+                                        </p:tav>
+                                      </p:tavLst>
+                                    </p:anim>
+                                  </p:childTnLst>
+                                </p:cTn>
+                              </p:par>
+                              <p:par>
+                                <p:cTn id="19" presetID="2" presetClass="entr" presetSubtype="4" fill="hold" grpId="0" nodeType="withEffect">
+                                  <p:stCondLst>
+                                    <p:cond delay="0"/>
+                                  </p:stCondLst>
+                                  <p:childTnLst>
+                                    <p:set>
+                                      <p:cBhvr>
+                                        <p:cTn id="20" dur="1" fill="hold">
+                                          <p:stCondLst>
+                                            <p:cond delay="0"/>
+                                          </p:stCondLst>
+                                        </p:cTn>
+                                        <p:tgtEl>
+                                          <p:spTgt spid="6"/>
+                                        </p:tgtEl>
+                                        <p:attrNameLst>
+                                          <p:attrName>style.visibility</p:attrName>
+                                        </p:attrNameLst>
+                                      </p:cBhvr>
+                                      <p:to>
+                                        <p:strVal val="visible"/>
+                                      </p:to>
+                                    </p:set>
+                                    <p:anim calcmode="lin" valueType="num">
+                                      <p:cBhvr additive="base">
+                                        <p:cTn id="21" dur="500" fill="hold"/>
+                                        <p:tgtEl>
+                                          <p:spTgt spid="6"/>
+                                        </p:tgtEl>
+                                        <p:attrNameLst>
+                                          <p:attrName>ppt_x</p:attrName>
+                                        </p:attrNameLst>
+                                      </p:cBhvr>
+                                      <p:tavLst>
+                                        <p:tav tm="0">
+                                          <p:val>
+                                            <p:strVal val="#ppt_x"/>
+                                          </p:val>
+                                        </p:tav>
+                                        <p:tav tm="100000">
+                                          <p:val>
+                                            <p:strVal val="#ppt_x"/>
+                                          </p:val>
+                                        </p:tav>
+                                      </p:tavLst>
+                                    </p:anim>
+                                    <p:anim calcmode="lin" valueType="num">
+                                      <p:cBhvr additive="base">
+                                        <p:cTn id="22" dur="500" fill="hold"/>
+                                        <p:tgtEl>
+                                          <p:spTgt spid="6"/>
+                                        </p:tgtEl>
+                                        <p:attrNameLst>
+                                          <p:attrName>ppt_y</p:attrName>
+                                        </p:attrNameLst>
+                                      </p:cBhvr>
+                                      <p:tavLst>
+                                        <p:tav tm="0">
+                                          <p:val>
+                                            <p:strVal val="1+#ppt_h/2"/>
+                                          </p:val>
+                                        </p:tav>
+                                        <p:tav tm="100000">
+                                          <p:val>
+                                            <p:strVal val="#ppt_y"/>
+                                          </p:val>
+                                        </p:tav>
+                                      </p:tavLst>
+                                    </p:anim>
+                                  </p:childTnLst>
+                                </p:cTn>
+                              </p:par>
+                            </p:childTnLst>
+                          </p:cTn>
+                        </p:par>
+                      </p:childTnLst>
+                    </p:cTn>
+                  </p:par>
+                  <p:par>
+                    <p:cTn id="23" fill="hold">
+                      <p:stCondLst>
+                        <p:cond delay="indefinite"/>
+                      </p:stCondLst>
+                      <p:childTnLst>
+                        <p:par>
+                          <p:cTn id="24" fill="hold">
+                            <p:stCondLst>
+                              <p:cond delay="0"/>
+                            </p:stCondLst>
+                            <p:childTnLst>
+                              <p:par>
+                                <p:cTn id="25" presetID="2" presetClass="entr" presetSubtype="4" fill="hold" grpId="0" nodeType="clickEffect">
+                                  <p:stCondLst>
+                                    <p:cond delay="0"/>
+                                  </p:stCondLst>
+                                  <p:childTnLst>
+                                    <p:set>
+                                      <p:cBhvr>
+                                        <p:cTn id="26" dur="1" fill="hold">
+                                          <p:stCondLst>
+                                            <p:cond delay="0"/>
+                                          </p:stCondLst>
+                                        </p:cTn>
+                                        <p:tgtEl>
+                                          <p:spTgt spid="16"/>
+                                        </p:tgtEl>
+                                        <p:attrNameLst>
+                                          <p:attrName>style.visibility</p:attrName>
+                                        </p:attrNameLst>
+                                      </p:cBhvr>
+                                      <p:to>
+                                        <p:strVal val="visible"/>
+                                      </p:to>
+                                    </p:set>
+                                    <p:anim calcmode="lin" valueType="num">
+                                      <p:cBhvr additive="base">
+                                        <p:cTn id="27" dur="500" fill="hold"/>
+                                        <p:tgtEl>
+                                          <p:spTgt spid="16"/>
+                                        </p:tgtEl>
+                                        <p:attrNameLst>
+                                          <p:attrName>ppt_x</p:attrName>
+                                        </p:attrNameLst>
+                                      </p:cBhvr>
+                                      <p:tavLst>
+                                        <p:tav tm="0">
+                                          <p:val>
+                                            <p:strVal val="#ppt_x"/>
+                                          </p:val>
+                                        </p:tav>
+                                        <p:tav tm="100000">
+                                          <p:val>
+                                            <p:strVal val="#ppt_x"/>
+                                          </p:val>
+                                        </p:tav>
+                                      </p:tavLst>
+                                    </p:anim>
+                                    <p:anim calcmode="lin" valueType="num">
+                                      <p:cBhvr additive="base">
+                                        <p:cTn id="28" dur="500" fill="hold"/>
+                                        <p:tgtEl>
+                                          <p:spTgt spid="16"/>
+                                        </p:tgtEl>
+                                        <p:attrNameLst>
+                                          <p:attrName>ppt_y</p:attrName>
+                                        </p:attrNameLst>
+                                      </p:cBhvr>
+                                      <p:tavLst>
+                                        <p:tav tm="0">
+                                          <p:val>
+                                            <p:strVal val="1+#ppt_h/2"/>
+                                          </p:val>
+                                        </p:tav>
+                                        <p:tav tm="100000">
+                                          <p:val>
+                                            <p:strVal val="#ppt_y"/>
+                                          </p:val>
+                                        </p:tav>
+                                      </p:tavLst>
+                                    </p:anim>
+                                  </p:childTnLst>
+                                </p:cTn>
+                              </p:par>
+                              <p:par>
+                                <p:cTn id="29" presetID="2" presetClass="entr" presetSubtype="4" fill="hold" nodeType="withEffect">
+                                  <p:stCondLst>
+                                    <p:cond delay="0"/>
+                                  </p:stCondLst>
+                                  <p:childTnLst>
+                                    <p:set>
+                                      <p:cBhvr>
+                                        <p:cTn id="30" dur="1" fill="hold">
+                                          <p:stCondLst>
+                                            <p:cond delay="0"/>
+                                          </p:stCondLst>
+                                        </p:cTn>
+                                        <p:tgtEl>
+                                          <p:spTgt spid="12"/>
+                                        </p:tgtEl>
+                                        <p:attrNameLst>
+                                          <p:attrName>style.visibility</p:attrName>
+                                        </p:attrNameLst>
+                                      </p:cBhvr>
+                                      <p:to>
+                                        <p:strVal val="visible"/>
+                                      </p:to>
+                                    </p:set>
+                                    <p:anim calcmode="lin" valueType="num">
+                                      <p:cBhvr additive="base">
+                                        <p:cTn id="31" dur="500" fill="hold"/>
+                                        <p:tgtEl>
+                                          <p:spTgt spid="12"/>
+                                        </p:tgtEl>
+                                        <p:attrNameLst>
+                                          <p:attrName>ppt_x</p:attrName>
+                                        </p:attrNameLst>
+                                      </p:cBhvr>
+                                      <p:tavLst>
+                                        <p:tav tm="0">
+                                          <p:val>
+                                            <p:strVal val="#ppt_x"/>
+                                          </p:val>
+                                        </p:tav>
+                                        <p:tav tm="100000">
+                                          <p:val>
+                                            <p:strVal val="#ppt_x"/>
+                                          </p:val>
+                                        </p:tav>
+                                      </p:tavLst>
+                                    </p:anim>
+                                    <p:anim calcmode="lin" valueType="num">
+                                      <p:cBhvr additive="base">
+                                        <p:cTn id="32" dur="500" fill="hold"/>
+                                        <p:tgtEl>
+                                          <p:spTgt spid="12"/>
+                                        </p:tgtEl>
+                                        <p:attrNameLst>
+                                          <p:attrName>ppt_y</p:attrName>
+                                        </p:attrNameLst>
+                                      </p:cBhvr>
+                                      <p:tavLst>
+                                        <p:tav tm="0">
+                                          <p:val>
+                                            <p:strVal val="1+#ppt_h/2"/>
+                                          </p:val>
+                                        </p:tav>
+                                        <p:tav tm="100000">
+                                          <p:val>
+                                            <p:strVal val="#ppt_y"/>
+                                          </p:val>
+                                        </p:tav>
+                                      </p:tavLst>
+                                    </p:anim>
+                                  </p:childTnLst>
+                                </p:cTn>
+                              </p:par>
+                            </p:childTnLst>
+                          </p:cTn>
+                        </p:par>
+                      </p:childTnLst>
+                    </p:cTn>
+                  </p:par>
+                  <p:par>
+                    <p:cTn id="33" fill="hold">
+                      <p:stCondLst>
+                        <p:cond delay="indefinite"/>
+                      </p:stCondLst>
+                      <p:childTnLst>
+                        <p:par>
+                          <p:cTn id="34" fill="hold">
+                            <p:stCondLst>
+                              <p:cond delay="0"/>
+                            </p:stCondLst>
+                            <p:childTnLst>
+                              <p:par>
+                                <p:cTn id="35" presetID="2" presetClass="entr" presetSubtype="4" fill="hold" nodeType="clickEffect">
+                                  <p:stCondLst>
+                                    <p:cond delay="0"/>
+                                  </p:stCondLst>
+                                  <p:childTnLst>
+                                    <p:set>
+                                      <p:cBhvr>
+                                        <p:cTn id="36" dur="1" fill="hold">
+                                          <p:stCondLst>
+                                            <p:cond delay="0"/>
+                                          </p:stCondLst>
+                                        </p:cTn>
+                                        <p:tgtEl>
+                                          <p:spTgt spid="9"/>
+                                        </p:tgtEl>
+                                        <p:attrNameLst>
+                                          <p:attrName>style.visibility</p:attrName>
+                                        </p:attrNameLst>
+                                      </p:cBhvr>
+                                      <p:to>
+                                        <p:strVal val="visible"/>
+                                      </p:to>
+                                    </p:set>
+                                    <p:anim calcmode="lin" valueType="num">
+                                      <p:cBhvr additive="base">
+                                        <p:cTn id="37" dur="500" fill="hold"/>
+                                        <p:tgtEl>
+                                          <p:spTgt spid="9"/>
+                                        </p:tgtEl>
+                                        <p:attrNameLst>
+                                          <p:attrName>ppt_x</p:attrName>
+                                        </p:attrNameLst>
+                                      </p:cBhvr>
+                                      <p:tavLst>
+                                        <p:tav tm="0">
+                                          <p:val>
+                                            <p:strVal val="#ppt_x"/>
+                                          </p:val>
+                                        </p:tav>
+                                        <p:tav tm="100000">
+                                          <p:val>
+                                            <p:strVal val="#ppt_x"/>
+                                          </p:val>
+                                        </p:tav>
+                                      </p:tavLst>
+                                    </p:anim>
+                                    <p:anim calcmode="lin" valueType="num">
+                                      <p:cBhvr additive="base">
+                                        <p:cTn id="38" dur="500" fill="hold"/>
+                                        <p:tgtEl>
+                                          <p:spTgt spid="9"/>
+                                        </p:tgtEl>
+                                        <p:attrNameLst>
+                                          <p:attrName>ppt_y</p:attrName>
+                                        </p:attrNameLst>
+                                      </p:cBhvr>
+                                      <p:tavLst>
+                                        <p:tav tm="0">
+                                          <p:val>
+                                            <p:strVal val="1+#ppt_h/2"/>
+                                          </p:val>
+                                        </p:tav>
+                                        <p:tav tm="100000">
+                                          <p:val>
+                                            <p:strVal val="#ppt_y"/>
+                                          </p:val>
+                                        </p:tav>
+                                      </p:tavLst>
+                                    </p:anim>
+                                  </p:childTnLst>
+                                </p:cTn>
+                              </p:par>
+                              <p:par>
+                                <p:cTn id="39" presetID="2" presetClass="entr" presetSubtype="4" fill="hold" grpId="0" nodeType="withEffect">
+                                  <p:stCondLst>
+                                    <p:cond delay="0"/>
+                                  </p:stCondLst>
+                                  <p:childTnLst>
+                                    <p:set>
+                                      <p:cBhvr>
+                                        <p:cTn id="40" dur="1" fill="hold">
+                                          <p:stCondLst>
+                                            <p:cond delay="0"/>
+                                          </p:stCondLst>
+                                        </p:cTn>
+                                        <p:tgtEl>
+                                          <p:spTgt spid="5"/>
+                                        </p:tgtEl>
+                                        <p:attrNameLst>
+                                          <p:attrName>style.visibility</p:attrName>
+                                        </p:attrNameLst>
+                                      </p:cBhvr>
+                                      <p:to>
+                                        <p:strVal val="visible"/>
+                                      </p:to>
+                                    </p:set>
+                                    <p:anim calcmode="lin" valueType="num">
+                                      <p:cBhvr additive="base">
+                                        <p:cTn id="41" dur="500" fill="hold"/>
+                                        <p:tgtEl>
+                                          <p:spTgt spid="5"/>
+                                        </p:tgtEl>
+                                        <p:attrNameLst>
+                                          <p:attrName>ppt_x</p:attrName>
+                                        </p:attrNameLst>
+                                      </p:cBhvr>
+                                      <p:tavLst>
+                                        <p:tav tm="0">
+                                          <p:val>
+                                            <p:strVal val="#ppt_x"/>
+                                          </p:val>
+                                        </p:tav>
+                                        <p:tav tm="100000">
+                                          <p:val>
+                                            <p:strVal val="#ppt_x"/>
+                                          </p:val>
+                                        </p:tav>
+                                      </p:tavLst>
+                                    </p:anim>
+                                    <p:anim calcmode="lin" valueType="num">
+                                      <p:cBhvr additive="base">
+                                        <p:cTn id="42" dur="500" fill="hold"/>
+                                        <p:tgtEl>
+                                          <p:spTgt spid="5"/>
+                                        </p:tgtEl>
+                                        <p:attrNameLst>
+                                          <p:attrName>ppt_y</p:attrName>
+                                        </p:attrNameLst>
+                                      </p:cBhvr>
+                                      <p:tavLst>
+                                        <p:tav tm="0">
+                                          <p:val>
+                                            <p:strVal val="1+#ppt_h/2"/>
+                                          </p:val>
+                                        </p:tav>
+                                        <p:tav tm="100000">
+                                          <p:val>
+                                            <p:strVal val="#ppt_y"/>
+                                          </p:val>
+                                        </p:tav>
+                                      </p:tavLst>
+                                    </p:anim>
+                                  </p:childTnLst>
+                                </p:cTn>
+                              </p:par>
+                            </p:childTnLst>
+                          </p:cTn>
+                        </p:par>
+                      </p:childTnLst>
+                    </p:cTn>
+                  </p:par>
+                  <p:par>
+                    <p:cTn id="43" fill="hold">
+                      <p:stCondLst>
+                        <p:cond delay="indefinite"/>
+                      </p:stCondLst>
+                      <p:childTnLst>
+                        <p:par>
+                          <p:cTn id="44" fill="hold">
+                            <p:stCondLst>
+                              <p:cond delay="0"/>
+                            </p:stCondLst>
+                            <p:childTnLst>
+                              <p:par>
+                                <p:cTn id="45" presetID="2" presetClass="entr" presetSubtype="4" fill="hold" nodeType="clickEffect">
+                                  <p:stCondLst>
+                                    <p:cond delay="0"/>
+                                  </p:stCondLst>
+                                  <p:childTnLst>
+                                    <p:set>
+                                      <p:cBhvr>
+                                        <p:cTn id="46" dur="1" fill="hold">
+                                          <p:stCondLst>
+                                            <p:cond delay="0"/>
+                                          </p:stCondLst>
+                                        </p:cTn>
+                                        <p:tgtEl>
+                                          <p:spTgt spid="13"/>
+                                        </p:tgtEl>
+                                        <p:attrNameLst>
+                                          <p:attrName>style.visibility</p:attrName>
+                                        </p:attrNameLst>
+                                      </p:cBhvr>
+                                      <p:to>
+                                        <p:strVal val="visible"/>
+                                      </p:to>
+                                    </p:set>
+                                    <p:anim calcmode="lin" valueType="num">
+                                      <p:cBhvr additive="base">
+                                        <p:cTn id="47" dur="500" fill="hold"/>
+                                        <p:tgtEl>
+                                          <p:spTgt spid="13"/>
+                                        </p:tgtEl>
+                                        <p:attrNameLst>
+                                          <p:attrName>ppt_x</p:attrName>
+                                        </p:attrNameLst>
+                                      </p:cBhvr>
+                                      <p:tavLst>
+                                        <p:tav tm="0">
+                                          <p:val>
+                                            <p:strVal val="#ppt_x"/>
+                                          </p:val>
+                                        </p:tav>
+                                        <p:tav tm="100000">
+                                          <p:val>
+                                            <p:strVal val="#ppt_x"/>
+                                          </p:val>
+                                        </p:tav>
+                                      </p:tavLst>
+                                    </p:anim>
+                                    <p:anim calcmode="lin" valueType="num">
+                                      <p:cBhvr additive="base">
+                                        <p:cTn id="48" dur="500" fill="hold"/>
+                                        <p:tgtEl>
+                                          <p:spTgt spid="13"/>
+                                        </p:tgtEl>
+                                        <p:attrNameLst>
+                                          <p:attrName>ppt_y</p:attrName>
+                                        </p:attrNameLst>
+                                      </p:cBhvr>
+                                      <p:tavLst>
+                                        <p:tav tm="0">
+                                          <p:val>
+                                            <p:strVal val="1+#ppt_h/2"/>
+                                          </p:val>
+                                        </p:tav>
+                                        <p:tav tm="100000">
+                                          <p:val>
+                                            <p:strVal val="#ppt_y"/>
+                                          </p:val>
+                                        </p:tav>
+                                      </p:tavLst>
+                                    </p:anim>
+                                  </p:childTnLst>
+                                </p:cTn>
+                              </p:par>
+                              <p:par>
+                                <p:cTn id="49" presetID="2" presetClass="entr" presetSubtype="4" fill="hold" grpId="0" nodeType="withEffect">
+                                  <p:stCondLst>
+                                    <p:cond delay="0"/>
+                                  </p:stCondLst>
+                                  <p:childTnLst>
+                                    <p:set>
+                                      <p:cBhvr>
+                                        <p:cTn id="50" dur="1" fill="hold">
+                                          <p:stCondLst>
+                                            <p:cond delay="0"/>
+                                          </p:stCondLst>
+                                        </p:cTn>
+                                        <p:tgtEl>
+                                          <p:spTgt spid="17"/>
+                                        </p:tgtEl>
+                                        <p:attrNameLst>
+                                          <p:attrName>style.visibility</p:attrName>
+                                        </p:attrNameLst>
+                                      </p:cBhvr>
+                                      <p:to>
+                                        <p:strVal val="visible"/>
+                                      </p:to>
+                                    </p:set>
+                                    <p:anim calcmode="lin" valueType="num">
+                                      <p:cBhvr additive="base">
+                                        <p:cTn id="51" dur="500" fill="hold"/>
+                                        <p:tgtEl>
+                                          <p:spTgt spid="17"/>
+                                        </p:tgtEl>
+                                        <p:attrNameLst>
+                                          <p:attrName>ppt_x</p:attrName>
+                                        </p:attrNameLst>
+                                      </p:cBhvr>
+                                      <p:tavLst>
+                                        <p:tav tm="0">
+                                          <p:val>
+                                            <p:strVal val="#ppt_x"/>
+                                          </p:val>
+                                        </p:tav>
+                                        <p:tav tm="100000">
+                                          <p:val>
+                                            <p:strVal val="#ppt_x"/>
+                                          </p:val>
+                                        </p:tav>
+                                      </p:tavLst>
+                                    </p:anim>
+                                    <p:anim calcmode="lin" valueType="num">
+                                      <p:cBhvr additive="base">
+                                        <p:cTn id="52" dur="500" fill="hold"/>
+                                        <p:tgtEl>
+                                          <p:spTgt spid="17"/>
+                                        </p:tgtEl>
+                                        <p:attrNameLst>
+                                          <p:attrName>ppt_y</p:attrName>
+                                        </p:attrNameLst>
+                                      </p:cBhvr>
+                                      <p:tavLst>
+                                        <p:tav tm="0">
+                                          <p:val>
+                                            <p:strVal val="1+#ppt_h/2"/>
+                                          </p:val>
+                                        </p:tav>
+                                        <p:tav tm="100000">
+                                          <p:val>
+                                            <p:strVal val="#ppt_y"/>
+                                          </p:val>
+                                        </p:tav>
+                                      </p:tavLst>
+                                    </p:anim>
+                                  </p:childTnLst>
+                                </p:cTn>
+                              </p:par>
+                            </p:childTnLst>
+                          </p:cTn>
+                        </p:par>
+                      </p:childTnLst>
+                    </p:cTn>
+                  </p:par>
+                  <p:par>
+                    <p:cTn id="53" fill="hold">
+                      <p:stCondLst>
+                        <p:cond delay="indefinite"/>
+                      </p:stCondLst>
+                      <p:childTnLst>
+                        <p:par>
+                          <p:cTn id="54" fill="hold">
+                            <p:stCondLst>
+                              <p:cond delay="0"/>
+                            </p:stCondLst>
+                            <p:childTnLst>
+                              <p:par>
+                                <p:cTn id="55" presetID="2" presetClass="entr" presetSubtype="4" fill="hold" nodeType="clickEffect">
+                                  <p:stCondLst>
+                                    <p:cond delay="0"/>
+                                  </p:stCondLst>
+                                  <p:childTnLst>
+                                    <p:set>
+                                      <p:cBhvr>
+                                        <p:cTn id="56" dur="1" fill="hold">
+                                          <p:stCondLst>
+                                            <p:cond delay="0"/>
+                                          </p:stCondLst>
+                                        </p:cTn>
+                                        <p:tgtEl>
+                                          <p:spTgt spid="10"/>
+                                        </p:tgtEl>
+                                        <p:attrNameLst>
+                                          <p:attrName>style.visibility</p:attrName>
+                                        </p:attrNameLst>
+                                      </p:cBhvr>
+                                      <p:to>
+                                        <p:strVal val="visible"/>
+                                      </p:to>
+                                    </p:set>
+                                    <p:anim calcmode="lin" valueType="num">
+                                      <p:cBhvr additive="base">
+                                        <p:cTn id="57" dur="500" fill="hold"/>
+                                        <p:tgtEl>
+                                          <p:spTgt spid="10"/>
+                                        </p:tgtEl>
+                                        <p:attrNameLst>
+                                          <p:attrName>ppt_x</p:attrName>
+                                        </p:attrNameLst>
+                                      </p:cBhvr>
+                                      <p:tavLst>
+                                        <p:tav tm="0">
+                                          <p:val>
+                                            <p:strVal val="#ppt_x"/>
+                                          </p:val>
+                                        </p:tav>
+                                        <p:tav tm="100000">
+                                          <p:val>
+                                            <p:strVal val="#ppt_x"/>
+                                          </p:val>
+                                        </p:tav>
+                                      </p:tavLst>
+                                    </p:anim>
+                                    <p:anim calcmode="lin" valueType="num">
+                                      <p:cBhvr additive="base">
+                                        <p:cTn id="58" dur="500" fill="hold"/>
+                                        <p:tgtEl>
+                                          <p:spTgt spid="10"/>
+                                        </p:tgtEl>
+                                        <p:attrNameLst>
+                                          <p:attrName>ppt_y</p:attrName>
+                                        </p:attrNameLst>
+                                      </p:cBhvr>
+                                      <p:tavLst>
+                                        <p:tav tm="0">
+                                          <p:val>
+                                            <p:strVal val="1+#ppt_h/2"/>
+                                          </p:val>
+                                        </p:tav>
+                                        <p:tav tm="100000">
+                                          <p:val>
+                                            <p:strVal val="#ppt_y"/>
+                                          </p:val>
+                                        </p:tav>
+                                      </p:tavLst>
+                                    </p:anim>
+                                  </p:childTnLst>
+                                </p:cTn>
+                              </p:par>
+                              <p:par>
+                                <p:cTn id="59" presetID="2" presetClass="entr" presetSubtype="4" fill="hold" grpId="0" nodeType="withEffect">
+                                  <p:stCondLst>
+                                    <p:cond delay="0"/>
+                                  </p:stCondLst>
+                                  <p:childTnLst>
+                                    <p:set>
+                                      <p:cBhvr>
+                                        <p:cTn id="60" dur="1" fill="hold">
+                                          <p:stCondLst>
+                                            <p:cond delay="0"/>
+                                          </p:stCondLst>
+                                        </p:cTn>
+                                        <p:tgtEl>
+                                          <p:spTgt spid="7"/>
+                                        </p:tgtEl>
+                                        <p:attrNameLst>
+                                          <p:attrName>style.visibility</p:attrName>
+                                        </p:attrNameLst>
+                                      </p:cBhvr>
+                                      <p:to>
+                                        <p:strVal val="visible"/>
+                                      </p:to>
+                                    </p:set>
+                                    <p:anim calcmode="lin" valueType="num">
+                                      <p:cBhvr additive="base">
+                                        <p:cTn id="61" dur="500" fill="hold"/>
+                                        <p:tgtEl>
+                                          <p:spTgt spid="7"/>
+                                        </p:tgtEl>
+                                        <p:attrNameLst>
+                                          <p:attrName>ppt_x</p:attrName>
+                                        </p:attrNameLst>
+                                      </p:cBhvr>
+                                      <p:tavLst>
+                                        <p:tav tm="0">
+                                          <p:val>
+                                            <p:strVal val="#ppt_x"/>
+                                          </p:val>
+                                        </p:tav>
+                                        <p:tav tm="100000">
+                                          <p:val>
+                                            <p:strVal val="#ppt_x"/>
+                                          </p:val>
+                                        </p:tav>
+                                      </p:tavLst>
+                                    </p:anim>
+                                    <p:anim calcmode="lin" valueType="num">
+                                      <p:cBhvr additive="base">
+                                        <p:cTn id="62" dur="500" fill="hold"/>
+                                        <p:tgtEl>
+                                          <p:spTgt spid="7"/>
+                                        </p:tgtEl>
+                                        <p:attrNameLst>
+                                          <p:attrName>ppt_y</p:attrName>
+                                        </p:attrNameLst>
+                                      </p:cBhvr>
+                                      <p:tavLst>
+                                        <p:tav tm="0">
+                                          <p:val>
+                                            <p:strVal val="1+#ppt_h/2"/>
+                                          </p:val>
+                                        </p:tav>
+                                        <p:tav tm="100000">
+                                          <p:val>
+                                            <p:strVal val="#ppt_y"/>
+                                          </p:val>
+                                        </p:tav>
+                                      </p:tavLst>
+                                    </p:anim>
+                                  </p:childTnLst>
+                                </p:cTn>
+                              </p:par>
+                            </p:childTnLst>
+                          </p:cTn>
+                        </p:par>
+                      </p:childTnLst>
+                    </p:cTn>
+                  </p:par>
+                  <p:par>
+                    <p:cTn id="63" fill="hold">
+                      <p:stCondLst>
+                        <p:cond delay="indefinite"/>
+                      </p:stCondLst>
+                      <p:childTnLst>
+                        <p:par>
+                          <p:cTn id="64" fill="hold">
+                            <p:stCondLst>
+                              <p:cond delay="0"/>
+                            </p:stCondLst>
+                            <p:childTnLst>
+                              <p:par>
+                                <p:cTn id="65" presetID="2" presetClass="entr" presetSubtype="4" fill="hold" grpId="0" nodeType="clickEffect">
+                                  <p:stCondLst>
+                                    <p:cond delay="0"/>
+                                  </p:stCondLst>
+                                  <p:childTnLst>
+                                    <p:set>
+                                      <p:cBhvr>
+                                        <p:cTn id="66" dur="1" fill="hold">
+                                          <p:stCondLst>
+                                            <p:cond delay="0"/>
+                                          </p:stCondLst>
+                                        </p:cTn>
+                                        <p:tgtEl>
+                                          <p:spTgt spid="18"/>
+                                        </p:tgtEl>
+                                        <p:attrNameLst>
+                                          <p:attrName>style.visibility</p:attrName>
+                                        </p:attrNameLst>
+                                      </p:cBhvr>
+                                      <p:to>
+                                        <p:strVal val="visible"/>
+                                      </p:to>
+                                    </p:set>
+                                    <p:anim calcmode="lin" valueType="num">
+                                      <p:cBhvr additive="base">
+                                        <p:cTn id="67" dur="500" fill="hold"/>
+                                        <p:tgtEl>
+                                          <p:spTgt spid="18"/>
+                                        </p:tgtEl>
+                                        <p:attrNameLst>
+                                          <p:attrName>ppt_x</p:attrName>
+                                        </p:attrNameLst>
+                                      </p:cBhvr>
+                                      <p:tavLst>
+                                        <p:tav tm="0">
+                                          <p:val>
+                                            <p:strVal val="#ppt_x"/>
+                                          </p:val>
+                                        </p:tav>
+                                        <p:tav tm="100000">
+                                          <p:val>
+                                            <p:strVal val="#ppt_x"/>
+                                          </p:val>
+                                        </p:tav>
+                                      </p:tavLst>
+                                    </p:anim>
+                                    <p:anim calcmode="lin" valueType="num">
+                                      <p:cBhvr additive="base">
+                                        <p:cTn id="68" dur="500" fill="hold"/>
+                                        <p:tgtEl>
+                                          <p:spTgt spid="18"/>
+                                        </p:tgtEl>
+                                        <p:attrNameLst>
+                                          <p:attrName>ppt_y</p:attrName>
+                                        </p:attrNameLst>
+                                      </p:cBhvr>
+                                      <p:tavLst>
+                                        <p:tav tm="0">
+                                          <p:val>
+                                            <p:strVal val="1+#ppt_h/2"/>
+                                          </p:val>
+                                        </p:tav>
+                                        <p:tav tm="100000">
+                                          <p:val>
+                                            <p:strVal val="#ppt_y"/>
+                                          </p:val>
+                                        </p:tav>
+                                      </p:tavLst>
+                                    </p:anim>
+                                  </p:childTnLst>
+                                </p:cTn>
+                              </p:par>
+                              <p:par>
+                                <p:cTn id="69" presetID="2" presetClass="entr" presetSubtype="4" fill="hold" nodeType="withEffect">
+                                  <p:stCondLst>
+                                    <p:cond delay="0"/>
+                                  </p:stCondLst>
+                                  <p:childTnLst>
+                                    <p:set>
+                                      <p:cBhvr>
+                                        <p:cTn id="70" dur="1" fill="hold">
+                                          <p:stCondLst>
+                                            <p:cond delay="0"/>
+                                          </p:stCondLst>
+                                        </p:cTn>
+                                        <p:tgtEl>
+                                          <p:spTgt spid="14"/>
+                                        </p:tgtEl>
+                                        <p:attrNameLst>
+                                          <p:attrName>style.visibility</p:attrName>
+                                        </p:attrNameLst>
+                                      </p:cBhvr>
+                                      <p:to>
+                                        <p:strVal val="visible"/>
+                                      </p:to>
+                                    </p:set>
+                                    <p:anim calcmode="lin" valueType="num">
+                                      <p:cBhvr additive="base">
+                                        <p:cTn id="71" dur="500" fill="hold"/>
+                                        <p:tgtEl>
+                                          <p:spTgt spid="14"/>
+                                        </p:tgtEl>
+                                        <p:attrNameLst>
+                                          <p:attrName>ppt_x</p:attrName>
+                                        </p:attrNameLst>
+                                      </p:cBhvr>
+                                      <p:tavLst>
+                                        <p:tav tm="0">
+                                          <p:val>
+                                            <p:strVal val="#ppt_x"/>
+                                          </p:val>
+                                        </p:tav>
+                                        <p:tav tm="100000">
+                                          <p:val>
+                                            <p:strVal val="#ppt_x"/>
+                                          </p:val>
+                                        </p:tav>
+                                      </p:tavLst>
+                                    </p:anim>
+                                    <p:anim calcmode="lin" valueType="num">
+                                      <p:cBhvr additive="base">
+                                        <p:cTn id="72" dur="500" fill="hold"/>
+                                        <p:tgtEl>
+                                          <p:spTgt spid="14"/>
+                                        </p:tgtEl>
+                                        <p:attrNameLst>
+                                          <p:attrName>ppt_y</p:attrName>
+                                        </p:attrNameLst>
+                                      </p:cBhvr>
+                                      <p:tavLst>
+                                        <p:tav tm="0">
+                                          <p:val>
+                                            <p:strVal val="1+#ppt_h/2"/>
+                                          </p:val>
+                                        </p:tav>
+                                        <p:tav tm="100000">
+                                          <p:val>
+                                            <p:strVal val="#ppt_y"/>
+                                          </p:val>
+                                        </p:tav>
+                                      </p:tavLst>
+                                    </p:anim>
+                                  </p:childTnLst>
+                                </p:cTn>
+                              </p:par>
+                            </p:childTnLst>
+                          </p:cTn>
+                        </p:par>
+                      </p:childTnLst>
+                    </p:cTn>
+                  </p:par>
+                  <p:par>
+                    <p:cTn id="73" fill="hold">
+                      <p:stCondLst>
+                        <p:cond delay="indefinite"/>
+                      </p:stCondLst>
+                      <p:childTnLst>
+                        <p:par>
+                          <p:cTn id="74" fill="hold">
+                            <p:stCondLst>
+                              <p:cond delay="0"/>
+                            </p:stCondLst>
+                            <p:childTnLst>
+                              <p:par>
+                                <p:cTn id="75" presetID="2" presetClass="entr" presetSubtype="4" fill="hold" grpId="0" nodeType="clickEffect">
+                                  <p:stCondLst>
+                                    <p:cond delay="0"/>
+                                  </p:stCondLst>
+                                  <p:childTnLst>
+                                    <p:set>
+                                      <p:cBhvr>
+                                        <p:cTn id="76" dur="1" fill="hold">
+                                          <p:stCondLst>
+                                            <p:cond delay="0"/>
+                                          </p:stCondLst>
+                                        </p:cTn>
+                                        <p:tgtEl>
+                                          <p:spTgt spid="19"/>
+                                        </p:tgtEl>
+                                        <p:attrNameLst>
+                                          <p:attrName>style.visibility</p:attrName>
+                                        </p:attrNameLst>
+                                      </p:cBhvr>
+                                      <p:to>
+                                        <p:strVal val="visible"/>
+                                      </p:to>
+                                    </p:set>
+                                    <p:anim calcmode="lin" valueType="num">
+                                      <p:cBhvr additive="base">
+                                        <p:cTn id="77" dur="500" fill="hold"/>
+                                        <p:tgtEl>
+                                          <p:spTgt spid="19"/>
+                                        </p:tgtEl>
+                                        <p:attrNameLst>
+                                          <p:attrName>ppt_x</p:attrName>
+                                        </p:attrNameLst>
+                                      </p:cBhvr>
+                                      <p:tavLst>
+                                        <p:tav tm="0">
+                                          <p:val>
+                                            <p:strVal val="#ppt_x"/>
+                                          </p:val>
+                                        </p:tav>
+                                        <p:tav tm="100000">
+                                          <p:val>
+                                            <p:strVal val="#ppt_x"/>
+                                          </p:val>
+                                        </p:tav>
+                                      </p:tavLst>
+                                    </p:anim>
+                                    <p:anim calcmode="lin" valueType="num">
+                                      <p:cBhvr additive="base">
+                                        <p:cTn id="78" dur="500" fill="hold"/>
+                                        <p:tgtEl>
+                                          <p:spTgt spid="19"/>
+                                        </p:tgtEl>
+                                        <p:attrNameLst>
+                                          <p:attrName>ppt_y</p:attrName>
+                                        </p:attrNameLst>
+                                      </p:cBhvr>
+                                      <p:tavLst>
+                                        <p:tav tm="0">
+                                          <p:val>
+                                            <p:strVal val="1+#ppt_h/2"/>
+                                          </p:val>
+                                        </p:tav>
+                                        <p:tav tm="100000">
+                                          <p:val>
+                                            <p:strVal val="#ppt_y"/>
+                                          </p:val>
+                                        </p:tav>
+                                      </p:tavLst>
+                                    </p:anim>
+                                  </p:childTnLst>
+                                </p:cTn>
+                              </p:par>
+                              <p:par>
+                                <p:cTn id="79" presetID="2" presetClass="entr" presetSubtype="4" fill="hold" grpId="0" nodeType="withEffect">
+                                  <p:stCondLst>
+                                    <p:cond delay="0"/>
+                                  </p:stCondLst>
+                                  <p:childTnLst>
+                                    <p:set>
+                                      <p:cBhvr>
+                                        <p:cTn id="80" dur="1" fill="hold">
+                                          <p:stCondLst>
+                                            <p:cond delay="0"/>
+                                          </p:stCondLst>
+                                        </p:cTn>
+                                        <p:tgtEl>
+                                          <p:spTgt spid="20"/>
+                                        </p:tgtEl>
+                                        <p:attrNameLst>
+                                          <p:attrName>style.visibility</p:attrName>
+                                        </p:attrNameLst>
+                                      </p:cBhvr>
+                                      <p:to>
+                                        <p:strVal val="visible"/>
+                                      </p:to>
+                                    </p:set>
+                                    <p:anim calcmode="lin" valueType="num">
+                                      <p:cBhvr additive="base">
+                                        <p:cTn id="81" dur="500" fill="hold"/>
+                                        <p:tgtEl>
+                                          <p:spTgt spid="20"/>
+                                        </p:tgtEl>
+                                        <p:attrNameLst>
+                                          <p:attrName>ppt_x</p:attrName>
+                                        </p:attrNameLst>
+                                      </p:cBhvr>
+                                      <p:tavLst>
+                                        <p:tav tm="0">
+                                          <p:val>
+                                            <p:strVal val="#ppt_x"/>
+                                          </p:val>
+                                        </p:tav>
+                                        <p:tav tm="100000">
+                                          <p:val>
+                                            <p:strVal val="#ppt_x"/>
+                                          </p:val>
+                                        </p:tav>
+                                      </p:tavLst>
+                                    </p:anim>
+                                    <p:anim calcmode="lin" valueType="num">
+                                      <p:cBhvr additive="base">
+                                        <p:cTn id="82" dur="500" fill="hold"/>
+                                        <p:tgtEl>
+                                          <p:spTgt spid="20"/>
+                                        </p:tgtEl>
+                                        <p:attrNameLst>
+                                          <p:attrName>ppt_y</p:attrName>
+                                        </p:attrNameLst>
+                                      </p:cBhvr>
+                                      <p:tavLst>
+                                        <p:tav tm="0">
+                                          <p:val>
+                                            <p:strVal val="1+#ppt_h/2"/>
+                                          </p:val>
+                                        </p:tav>
+                                        <p:tav tm="100000">
+                                          <p:val>
+                                            <p:strVal val="#ppt_y"/>
+                                          </p:val>
+                                        </p:tav>
+                                      </p:tavLst>
+                                    </p:anim>
+                                  </p:childTnLst>
+                                </p:cTn>
+                              </p:par>
+                            </p:childTnLst>
+                          </p:cTn>
+                        </p:par>
+                      </p:childTnLst>
+                    </p:cTn>
+                  </p:par>
+                </p:childTnLst>
+              </p:cTn>
+              <p:prevCondLst>
+                <p:cond evt="onPrev" delay="0">
+                  <p:tgtEl>
+                    <p:sldTgt/>
+                  </p:tgtEl>
+                </p:cond>
+              </p:prevCondLst>
+              <p:nextCondLst>
+                <p:cond evt="onNext" delay="0">
+                  <p:tgtEl>
+                    <p:sldTgt/>
+                  </p:tgtEl>
+                </p:cond>
+              </p:nextCondLst>
+            </p:seq>
+          </p:childTnLst>
+        </p:cTn>
+      </p:par>
+    </p:tnLst>
+    <p:bldLst>
+      <p:bldP spid="5" grpId="0" animBg="1"/>
+      <p:bldP spid="6" grpId="0" animBg="1"/>
+      <p:bldP spid="7" grpId="0" animBg="1"/>
+      <p:bldP spid="15" grpId="0" animBg="1"/>
+      <p:bldP spid="16" grpId="0" animBg="1"/>
+      <p:bldP spid="17" grpId="0" animBg="1"/>
+      <p:bldP spid="18" grpId="0" animBg="1"/>
+      <p:bldP spid="19" grpId="0" animBg="1"/>
+      <p:bldP spid="20" grpId="0" animBg="1"/>
+    </p:bldLst>
+  </p:timing>
+</p:sld>
+</file>
+
 <file path=ppt/theme/theme1.xml><?xml version="1.0" encoding="utf-8"?>
 <a:theme xmlns:a="http://schemas.openxmlformats.org/drawingml/2006/main" name="Tema do Office">
   <a:themeElements>

</xml_diff>